<commit_message>
Updating flow diagram for edge portal
</commit_message>
<xml_diff>
--- a/MECM PT/Release V1.1/Edge Autonomous Portal.pptx
+++ b/MECM PT/Release V1.1/Edge Autonomous Portal.pptx
@@ -129,7 +129,7 @@
                 </a:uFill>
                 <a:latin typeface="Times New Roman"/>
               </a:rPr>
-              <a:t>&lt;header&gt;</a:t>
+              <a:t> </a:t>
             </a:r>
             <a:endParaRPr b="0" lang="en-IN" sz="1400" spc="-1" strike="noStrike">
               <a:solidFill>
@@ -269,7 +269,7 @@
           <a:bodyPr lIns="0" rIns="0" tIns="0" bIns="0" anchor="b"/>
           <a:p>
             <a:pPr algn="r"/>
-            <a:fld id="{5288F2AC-F288-4690-8654-CC6D2A93BB8D}" type="slidenum">
+            <a:fld id="{4B64E8C9-75C8-493C-AC5D-D18135104EAA}" type="slidenum">
               <a:rPr b="0" lang="en-IN" sz="1400" spc="-1" strike="noStrike">
                 <a:solidFill>
                   <a:srgbClr val="000000"/>
@@ -322,7 +322,7 @@
       </p:grpSpPr>
       <p:sp>
         <p:nvSpPr>
-          <p:cNvPr id="306" name="PlaceHolder 1"/>
+          <p:cNvPr id="307" name="PlaceHolder 1"/>
           <p:cNvSpPr>
             <a:spLocks noGrp="1"/>
           </p:cNvSpPr>
@@ -333,7 +333,7 @@
         <p:spPr>
           <a:xfrm>
             <a:off x="756000" y="5145480"/>
-            <a:ext cx="6045480" cy="4207320"/>
+            <a:ext cx="6044760" cy="4206600"/>
           </a:xfrm>
           <a:prstGeom prst="rect">
             <a:avLst/>
@@ -358,14 +358,14 @@
       </p:sp>
       <p:sp>
         <p:nvSpPr>
-          <p:cNvPr id="307" name="CustomShape 2"/>
+          <p:cNvPr id="308" name="CustomShape 2"/>
           <p:cNvSpPr/>
           <p:nvPr/>
         </p:nvSpPr>
         <p:spPr>
           <a:xfrm>
             <a:off x="4282200" y="10155600"/>
-            <a:ext cx="3273480" cy="533880"/>
+            <a:ext cx="3272760" cy="533160"/>
           </a:xfrm>
           <a:prstGeom prst="rect">
             <a:avLst/>
@@ -5764,7 +5764,7 @@
       </p:grpSpPr>
       <p:sp>
         <p:nvSpPr>
-          <p:cNvPr id="156" name="PlaceHolder 1"/>
+          <p:cNvPr id="150" name="PlaceHolder 1"/>
           <p:cNvSpPr>
             <a:spLocks noGrp="1"/>
           </p:cNvSpPr>
@@ -5801,7 +5801,7 @@
       </p:sp>
       <p:sp>
         <p:nvSpPr>
-          <p:cNvPr id="157" name="PlaceHolder 2"/>
+          <p:cNvPr id="151" name="PlaceHolder 2"/>
           <p:cNvSpPr>
             <a:spLocks noGrp="1"/>
           </p:cNvSpPr>
@@ -5860,7 +5860,7 @@
       </p:grpSpPr>
       <p:sp>
         <p:nvSpPr>
-          <p:cNvPr id="158" name="PlaceHolder 1"/>
+          <p:cNvPr id="152" name="PlaceHolder 1"/>
           <p:cNvSpPr>
             <a:spLocks noGrp="1"/>
           </p:cNvSpPr>
@@ -5897,7 +5897,7 @@
       </p:sp>
       <p:sp>
         <p:nvSpPr>
-          <p:cNvPr id="159" name="PlaceHolder 2"/>
+          <p:cNvPr id="153" name="PlaceHolder 2"/>
           <p:cNvSpPr>
             <a:spLocks noGrp="1"/>
           </p:cNvSpPr>
@@ -5955,7 +5955,7 @@
       </p:grpSpPr>
       <p:sp>
         <p:nvSpPr>
-          <p:cNvPr id="160" name="PlaceHolder 1"/>
+          <p:cNvPr id="154" name="PlaceHolder 1"/>
           <p:cNvSpPr>
             <a:spLocks noGrp="1"/>
           </p:cNvSpPr>
@@ -5992,7 +5992,7 @@
       </p:sp>
       <p:sp>
         <p:nvSpPr>
-          <p:cNvPr id="161" name="PlaceHolder 2"/>
+          <p:cNvPr id="155" name="PlaceHolder 2"/>
           <p:cNvSpPr>
             <a:spLocks noGrp="1"/>
           </p:cNvSpPr>
@@ -6028,7 +6028,7 @@
       </p:sp>
       <p:sp>
         <p:nvSpPr>
-          <p:cNvPr id="162" name="PlaceHolder 3"/>
+          <p:cNvPr id="156" name="PlaceHolder 3"/>
           <p:cNvSpPr>
             <a:spLocks noGrp="1"/>
           </p:cNvSpPr>
@@ -6086,7 +6086,7 @@
       </p:grpSpPr>
       <p:sp>
         <p:nvSpPr>
-          <p:cNvPr id="163" name="PlaceHolder 1"/>
+          <p:cNvPr id="157" name="PlaceHolder 1"/>
           <p:cNvSpPr>
             <a:spLocks noGrp="1"/>
           </p:cNvSpPr>
@@ -6145,7 +6145,7 @@
       </p:grpSpPr>
       <p:sp>
         <p:nvSpPr>
-          <p:cNvPr id="164" name="PlaceHolder 1"/>
+          <p:cNvPr id="158" name="PlaceHolder 1"/>
           <p:cNvSpPr>
             <a:spLocks noGrp="1"/>
           </p:cNvSpPr>
@@ -6204,7 +6204,7 @@
       </p:grpSpPr>
       <p:sp>
         <p:nvSpPr>
-          <p:cNvPr id="165" name="PlaceHolder 1"/>
+          <p:cNvPr id="159" name="PlaceHolder 1"/>
           <p:cNvSpPr>
             <a:spLocks noGrp="1"/>
           </p:cNvSpPr>
@@ -6241,7 +6241,7 @@
       </p:sp>
       <p:sp>
         <p:nvSpPr>
-          <p:cNvPr id="166" name="PlaceHolder 2"/>
+          <p:cNvPr id="160" name="PlaceHolder 2"/>
           <p:cNvSpPr>
             <a:spLocks noGrp="1"/>
           </p:cNvSpPr>
@@ -6277,7 +6277,7 @@
       </p:sp>
       <p:sp>
         <p:nvSpPr>
-          <p:cNvPr id="167" name="PlaceHolder 3"/>
+          <p:cNvPr id="161" name="PlaceHolder 3"/>
           <p:cNvSpPr>
             <a:spLocks noGrp="1"/>
           </p:cNvSpPr>
@@ -6313,7 +6313,7 @@
       </p:sp>
       <p:sp>
         <p:nvSpPr>
-          <p:cNvPr id="168" name="PlaceHolder 4"/>
+          <p:cNvPr id="162" name="PlaceHolder 4"/>
           <p:cNvSpPr>
             <a:spLocks noGrp="1"/>
           </p:cNvSpPr>
@@ -6371,7 +6371,7 @@
       </p:grpSpPr>
       <p:sp>
         <p:nvSpPr>
-          <p:cNvPr id="169" name="PlaceHolder 1"/>
+          <p:cNvPr id="163" name="PlaceHolder 1"/>
           <p:cNvSpPr>
             <a:spLocks noGrp="1"/>
           </p:cNvSpPr>
@@ -6408,7 +6408,7 @@
       </p:sp>
       <p:sp>
         <p:nvSpPr>
-          <p:cNvPr id="170" name="PlaceHolder 2"/>
+          <p:cNvPr id="164" name="PlaceHolder 2"/>
           <p:cNvSpPr>
             <a:spLocks noGrp="1"/>
           </p:cNvSpPr>
@@ -6444,7 +6444,7 @@
       </p:sp>
       <p:sp>
         <p:nvSpPr>
-          <p:cNvPr id="171" name="PlaceHolder 3"/>
+          <p:cNvPr id="165" name="PlaceHolder 3"/>
           <p:cNvSpPr>
             <a:spLocks noGrp="1"/>
           </p:cNvSpPr>
@@ -6480,7 +6480,7 @@
       </p:sp>
       <p:sp>
         <p:nvSpPr>
-          <p:cNvPr id="172" name="PlaceHolder 4"/>
+          <p:cNvPr id="166" name="PlaceHolder 4"/>
           <p:cNvSpPr>
             <a:spLocks noGrp="1"/>
           </p:cNvSpPr>
@@ -6538,7 +6538,7 @@
       </p:grpSpPr>
       <p:sp>
         <p:nvSpPr>
-          <p:cNvPr id="173" name="PlaceHolder 1"/>
+          <p:cNvPr id="167" name="PlaceHolder 1"/>
           <p:cNvSpPr>
             <a:spLocks noGrp="1"/>
           </p:cNvSpPr>
@@ -6575,7 +6575,7 @@
       </p:sp>
       <p:sp>
         <p:nvSpPr>
-          <p:cNvPr id="174" name="PlaceHolder 2"/>
+          <p:cNvPr id="168" name="PlaceHolder 2"/>
           <p:cNvSpPr>
             <a:spLocks noGrp="1"/>
           </p:cNvSpPr>
@@ -6611,7 +6611,7 @@
       </p:sp>
       <p:sp>
         <p:nvSpPr>
-          <p:cNvPr id="175" name="PlaceHolder 3"/>
+          <p:cNvPr id="169" name="PlaceHolder 3"/>
           <p:cNvSpPr>
             <a:spLocks noGrp="1"/>
           </p:cNvSpPr>
@@ -6647,7 +6647,7 @@
       </p:sp>
       <p:sp>
         <p:nvSpPr>
-          <p:cNvPr id="176" name="PlaceHolder 4"/>
+          <p:cNvPr id="170" name="PlaceHolder 4"/>
           <p:cNvSpPr>
             <a:spLocks noGrp="1"/>
           </p:cNvSpPr>
@@ -6705,7 +6705,7 @@
       </p:grpSpPr>
       <p:sp>
         <p:nvSpPr>
-          <p:cNvPr id="177" name="PlaceHolder 1"/>
+          <p:cNvPr id="171" name="PlaceHolder 1"/>
           <p:cNvSpPr>
             <a:spLocks noGrp="1"/>
           </p:cNvSpPr>
@@ -6742,7 +6742,7 @@
       </p:sp>
       <p:sp>
         <p:nvSpPr>
-          <p:cNvPr id="178" name="PlaceHolder 2"/>
+          <p:cNvPr id="172" name="PlaceHolder 2"/>
           <p:cNvSpPr>
             <a:spLocks noGrp="1"/>
           </p:cNvSpPr>
@@ -6778,7 +6778,7 @@
       </p:sp>
       <p:sp>
         <p:nvSpPr>
-          <p:cNvPr id="179" name="PlaceHolder 3"/>
+          <p:cNvPr id="173" name="PlaceHolder 3"/>
           <p:cNvSpPr>
             <a:spLocks noGrp="1"/>
           </p:cNvSpPr>
@@ -6836,7 +6836,7 @@
       </p:grpSpPr>
       <p:sp>
         <p:nvSpPr>
-          <p:cNvPr id="180" name="PlaceHolder 1"/>
+          <p:cNvPr id="174" name="PlaceHolder 1"/>
           <p:cNvSpPr>
             <a:spLocks noGrp="1"/>
           </p:cNvSpPr>
@@ -6873,7 +6873,7 @@
       </p:sp>
       <p:sp>
         <p:nvSpPr>
-          <p:cNvPr id="181" name="PlaceHolder 2"/>
+          <p:cNvPr id="175" name="PlaceHolder 2"/>
           <p:cNvSpPr>
             <a:spLocks noGrp="1"/>
           </p:cNvSpPr>
@@ -6909,7 +6909,7 @@
       </p:sp>
       <p:sp>
         <p:nvSpPr>
-          <p:cNvPr id="182" name="PlaceHolder 3"/>
+          <p:cNvPr id="176" name="PlaceHolder 3"/>
           <p:cNvSpPr>
             <a:spLocks noGrp="1"/>
           </p:cNvSpPr>
@@ -6945,7 +6945,7 @@
       </p:sp>
       <p:sp>
         <p:nvSpPr>
-          <p:cNvPr id="183" name="PlaceHolder 4"/>
+          <p:cNvPr id="177" name="PlaceHolder 4"/>
           <p:cNvSpPr>
             <a:spLocks noGrp="1"/>
           </p:cNvSpPr>
@@ -6981,7 +6981,7 @@
       </p:sp>
       <p:sp>
         <p:nvSpPr>
-          <p:cNvPr id="184" name="PlaceHolder 5"/>
+          <p:cNvPr id="178" name="PlaceHolder 5"/>
           <p:cNvSpPr>
             <a:spLocks noGrp="1"/>
           </p:cNvSpPr>
@@ -7098,7 +7098,7 @@
       </p:grpSpPr>
       <p:sp>
         <p:nvSpPr>
-          <p:cNvPr id="185" name="PlaceHolder 1"/>
+          <p:cNvPr id="179" name="PlaceHolder 1"/>
           <p:cNvSpPr>
             <a:spLocks noGrp="1"/>
           </p:cNvSpPr>
@@ -7135,7 +7135,7 @@
       </p:sp>
       <p:sp>
         <p:nvSpPr>
-          <p:cNvPr id="186" name="PlaceHolder 2"/>
+          <p:cNvPr id="180" name="PlaceHolder 2"/>
           <p:cNvSpPr>
             <a:spLocks noGrp="1"/>
           </p:cNvSpPr>
@@ -7171,7 +7171,7 @@
       </p:sp>
       <p:sp>
         <p:nvSpPr>
-          <p:cNvPr id="187" name="PlaceHolder 3"/>
+          <p:cNvPr id="181" name="PlaceHolder 3"/>
           <p:cNvSpPr>
             <a:spLocks noGrp="1"/>
           </p:cNvSpPr>
@@ -7207,7 +7207,7 @@
       </p:sp>
       <p:pic>
         <p:nvPicPr>
-          <p:cNvPr id="188" name="" descr=""/>
+          <p:cNvPr id="182" name="" descr=""/>
           <p:cNvPicPr/>
           <p:nvPr/>
         </p:nvPicPr>
@@ -7230,7 +7230,7 @@
       </p:pic>
       <p:pic>
         <p:nvPicPr>
-          <p:cNvPr id="189" name="" descr=""/>
+          <p:cNvPr id="183" name="" descr=""/>
           <p:cNvPicPr/>
           <p:nvPr/>
         </p:nvPicPr>
@@ -9268,7 +9268,7 @@
         <p:spPr>
           <a:xfrm>
             <a:off x="1800" y="0"/>
-            <a:ext cx="10073880" cy="7557480"/>
+            <a:ext cx="10073160" cy="7556760"/>
           </a:xfrm>
           <a:prstGeom prst="rect">
             <a:avLst/>
@@ -9287,7 +9287,7 @@
         <p:spPr>
           <a:xfrm>
             <a:off x="0" y="3177000"/>
-            <a:ext cx="10075680" cy="4380120"/>
+            <a:ext cx="10074960" cy="4379400"/>
           </a:xfrm>
           <a:prstGeom prst="rect">
             <a:avLst/>
@@ -9320,7 +9320,7 @@
         <p:spPr>
           <a:xfrm>
             <a:off x="128520" y="345960"/>
-            <a:ext cx="1793520" cy="618840"/>
+            <a:ext cx="1792800" cy="618120"/>
           </a:xfrm>
           <a:prstGeom prst="rect">
             <a:avLst/>
@@ -9343,7 +9343,7 @@
         <p:spPr>
           <a:xfrm>
             <a:off x="0" y="4996800"/>
-            <a:ext cx="10077840" cy="2560320"/>
+            <a:ext cx="10077120" cy="2559600"/>
           </a:xfrm>
           <a:prstGeom prst="rect">
             <a:avLst/>
@@ -9366,7 +9366,7 @@
         <p:spPr>
           <a:xfrm>
             <a:off x="504000" y="301320"/>
-            <a:ext cx="9071640" cy="1261440"/>
+            <a:ext cx="9072000" cy="1261800"/>
           </a:xfrm>
           <a:prstGeom prst="rect">
             <a:avLst/>
@@ -9376,6 +9376,20 @@
           <a:bodyPr lIns="0" rIns="0" tIns="0" bIns="0" anchor="ctr"/>
           <a:p>
             <a:pPr algn="ctr"/>
+            <a:r>
+              <a:rPr b="0" lang="en-IN" sz="4400" spc="-1" strike="noStrike">
+                <a:solidFill>
+                  <a:srgbClr val="000000"/>
+                </a:solidFill>
+                <a:uFill>
+                  <a:solidFill>
+                    <a:srgbClr val="ffffff"/>
+                  </a:solidFill>
+                </a:uFill>
+                <a:latin typeface="Arial"/>
+              </a:rPr>
+              <a:t>Click to edit the title text format</a:t>
+            </a:r>
             <a:endParaRPr b="0" lang="en-IN" sz="4400" spc="-1" strike="noStrike">
               <a:solidFill>
                 <a:srgbClr val="000000"/>
@@ -9403,7 +9417,7 @@
         <p:spPr>
           <a:xfrm>
             <a:off x="504000" y="1768680"/>
-            <a:ext cx="9071640" cy="4383720"/>
+            <a:ext cx="9072000" cy="4384080"/>
           </a:xfrm>
           <a:prstGeom prst="rect">
             <a:avLst/>
@@ -9421,7 +9435,7 @@
               <a:buChar char=""/>
             </a:pPr>
             <a:r>
-              <a:rPr b="0" lang="en-IN" sz="1800" spc="-1" strike="noStrike">
+              <a:rPr b="0" lang="en-IN" sz="3200" spc="-1" strike="noStrike">
                 <a:solidFill>
                   <a:srgbClr val="000000"/>
                 </a:solidFill>
@@ -9434,7 +9448,7 @@
               </a:rPr>
               <a:t>Click to edit the outline text format</a:t>
             </a:r>
-            <a:endParaRPr b="0" lang="en-IN" sz="1800" spc="-1" strike="noStrike">
+            <a:endParaRPr b="0" lang="en-IN" sz="3200" spc="-1" strike="noStrike">
               <a:solidFill>
                 <a:srgbClr val="000000"/>
               </a:solidFill>
@@ -9456,7 +9470,7 @@
               <a:buChar char=""/>
             </a:pPr>
             <a:r>
-              <a:rPr b="0" lang="en-IN" sz="1800" spc="-1" strike="noStrike">
+              <a:rPr b="0" lang="en-IN" sz="2800" spc="-1" strike="noStrike">
                 <a:solidFill>
                   <a:srgbClr val="000000"/>
                 </a:solidFill>
@@ -9469,7 +9483,7 @@
               </a:rPr>
               <a:t>Second Outline Level</a:t>
             </a:r>
-            <a:endParaRPr b="0" lang="en-IN" sz="1800" spc="-1" strike="noStrike">
+            <a:endParaRPr b="0" lang="en-IN" sz="2800" spc="-1" strike="noStrike">
               <a:solidFill>
                 <a:srgbClr val="000000"/>
               </a:solidFill>
@@ -9491,7 +9505,7 @@
               <a:buChar char=""/>
             </a:pPr>
             <a:r>
-              <a:rPr b="0" lang="en-IN" sz="1800" spc="-1" strike="noStrike">
+              <a:rPr b="0" lang="en-IN" sz="2400" spc="-1" strike="noStrike">
                 <a:solidFill>
                   <a:srgbClr val="000000"/>
                 </a:solidFill>
@@ -9504,7 +9518,7 @@
               </a:rPr>
               <a:t>Third Outline Level</a:t>
             </a:r>
-            <a:endParaRPr b="0" lang="en-IN" sz="1800" spc="-1" strike="noStrike">
+            <a:endParaRPr b="0" lang="en-IN" sz="2400" spc="-1" strike="noStrike">
               <a:solidFill>
                 <a:srgbClr val="000000"/>
               </a:solidFill>
@@ -9526,7 +9540,7 @@
               <a:buChar char=""/>
             </a:pPr>
             <a:r>
-              <a:rPr b="0" lang="en-IN" sz="1800" spc="-1" strike="noStrike">
+              <a:rPr b="0" lang="en-IN" sz="2000" spc="-1" strike="noStrike">
                 <a:solidFill>
                   <a:srgbClr val="000000"/>
                 </a:solidFill>
@@ -9539,7 +9553,7 @@
               </a:rPr>
               <a:t>Fourth Outline Level</a:t>
             </a:r>
-            <a:endParaRPr b="0" lang="en-IN" sz="1800" spc="-1" strike="noStrike">
+            <a:endParaRPr b="0" lang="en-IN" sz="2000" spc="-1" strike="noStrike">
               <a:solidFill>
                 <a:srgbClr val="000000"/>
               </a:solidFill>
@@ -9561,7 +9575,7 @@
               <a:buChar char=""/>
             </a:pPr>
             <a:r>
-              <a:rPr b="0" lang="en-IN" sz="1800" spc="-1" strike="noStrike">
+              <a:rPr b="0" lang="en-IN" sz="2000" spc="-1" strike="noStrike">
                 <a:solidFill>
                   <a:srgbClr val="000000"/>
                 </a:solidFill>
@@ -9574,7 +9588,7 @@
               </a:rPr>
               <a:t>Fifth Outline Level</a:t>
             </a:r>
-            <a:endParaRPr b="0" lang="en-IN" sz="1800" spc="-1" strike="noStrike">
+            <a:endParaRPr b="0" lang="en-IN" sz="2000" spc="-1" strike="noStrike">
               <a:solidFill>
                 <a:srgbClr val="000000"/>
               </a:solidFill>
@@ -9596,7 +9610,7 @@
               <a:buChar char=""/>
             </a:pPr>
             <a:r>
-              <a:rPr b="0" lang="en-IN" sz="1800" spc="-1" strike="noStrike">
+              <a:rPr b="0" lang="en-IN" sz="2000" spc="-1" strike="noStrike">
                 <a:solidFill>
                   <a:srgbClr val="000000"/>
                 </a:solidFill>
@@ -9609,7 +9623,7 @@
               </a:rPr>
               <a:t>Sixth Outline Level</a:t>
             </a:r>
-            <a:endParaRPr b="0" lang="en-IN" sz="1800" spc="-1" strike="noStrike">
+            <a:endParaRPr b="0" lang="en-IN" sz="2000" spc="-1" strike="noStrike">
               <a:solidFill>
                 <a:srgbClr val="000000"/>
               </a:solidFill>
@@ -9631,7 +9645,7 @@
               <a:buChar char=""/>
             </a:pPr>
             <a:r>
-              <a:rPr b="0" lang="en-IN" sz="1800" spc="-1" strike="noStrike">
+              <a:rPr b="0" lang="en-IN" sz="2000" spc="-1" strike="noStrike">
                 <a:solidFill>
                   <a:srgbClr val="000000"/>
                 </a:solidFill>
@@ -9644,7 +9658,7 @@
               </a:rPr>
               <a:t>Seventh Outline Level</a:t>
             </a:r>
-            <a:endParaRPr b="0" lang="en-IN" sz="1800" spc="-1" strike="noStrike">
+            <a:endParaRPr b="0" lang="en-IN" sz="2000" spc="-1" strike="noStrike">
               <a:solidFill>
                 <a:srgbClr val="000000"/>
               </a:solidFill>
@@ -9681,6 +9695,13 @@
 <file path=ppt/slideMasters/slideMaster2.xml><?xml version="1.0" encoding="utf-8"?>
 <p:sldMaster xmlns:a="http://schemas.openxmlformats.org/drawingml/2006/main" xmlns:p="http://schemas.openxmlformats.org/presentationml/2006/main" xmlns:r="http://schemas.openxmlformats.org/officeDocument/2006/relationships" xmlns:p14="http://schemas.microsoft.com/office/powerpoint/2010/main" xmlns:p15="http://schemas.microsoft.com/office/powerpoint/2012/main" xmlns:mc="http://schemas.openxmlformats.org/markup-compatibility/2006">
   <p:cSld>
+    <p:bg>
+      <p:bgPr>
+        <a:solidFill>
+          <a:srgbClr val="ffffff"/>
+        </a:solidFill>
+      </p:bgPr>
+    </p:bg>
     <p:spTree>
       <p:nvGrpSpPr>
         <p:cNvPr id="1" name=""/>
@@ -9730,105 +9751,7 @@
                 </a:uFill>
                 <a:latin typeface="Arial"/>
               </a:rPr>
-              <a:t>Clic</a:t>
-            </a:r>
-            <a:r>
-              <a:rPr b="0" lang="en-IN" sz="4400" spc="-1" strike="noStrike">
-                <a:solidFill>
-                  <a:srgbClr val="000000"/>
-                </a:solidFill>
-                <a:uFill>
-                  <a:solidFill>
-                    <a:srgbClr val="ffffff"/>
-                  </a:solidFill>
-                </a:uFill>
-                <a:latin typeface="Arial"/>
-              </a:rPr>
-              <a:t>k to </a:t>
-            </a:r>
-            <a:r>
-              <a:rPr b="0" lang="en-IN" sz="4400" spc="-1" strike="noStrike">
-                <a:solidFill>
-                  <a:srgbClr val="000000"/>
-                </a:solidFill>
-                <a:uFill>
-                  <a:solidFill>
-                    <a:srgbClr val="ffffff"/>
-                  </a:solidFill>
-                </a:uFill>
-                <a:latin typeface="Arial"/>
-              </a:rPr>
-              <a:t>edit </a:t>
-            </a:r>
-            <a:r>
-              <a:rPr b="0" lang="en-IN" sz="4400" spc="-1" strike="noStrike">
-                <a:solidFill>
-                  <a:srgbClr val="000000"/>
-                </a:solidFill>
-                <a:uFill>
-                  <a:solidFill>
-                    <a:srgbClr val="ffffff"/>
-                  </a:solidFill>
-                </a:uFill>
-                <a:latin typeface="Arial"/>
-              </a:rPr>
-              <a:t>the </a:t>
-            </a:r>
-            <a:r>
-              <a:rPr b="0" lang="en-IN" sz="4400" spc="-1" strike="noStrike">
-                <a:solidFill>
-                  <a:srgbClr val="000000"/>
-                </a:solidFill>
-                <a:uFill>
-                  <a:solidFill>
-                    <a:srgbClr val="ffffff"/>
-                  </a:solidFill>
-                </a:uFill>
-                <a:latin typeface="Arial"/>
-              </a:rPr>
-              <a:t>title </a:t>
-            </a:r>
-            <a:r>
-              <a:rPr b="0" lang="en-IN" sz="4400" spc="-1" strike="noStrike">
-                <a:solidFill>
-                  <a:srgbClr val="000000"/>
-                </a:solidFill>
-                <a:uFill>
-                  <a:solidFill>
-                    <a:srgbClr val="ffffff"/>
-                  </a:solidFill>
-                </a:uFill>
-                <a:latin typeface="Arial"/>
-              </a:rPr>
-              <a:t>text </a:t>
-            </a:r>
-            <a:r>
-              <a:rPr b="0" lang="en-IN" sz="4400" spc="-1" strike="noStrike">
-                <a:solidFill>
-                  <a:srgbClr val="000000"/>
-                </a:solidFill>
-                <a:uFill>
-                  <a:solidFill>
-                    <a:srgbClr val="ffffff"/>
-                  </a:solidFill>
-                </a:uFill>
-                <a:latin typeface="Arial"/>
-              </a:rPr>
-              <a:t>form</a:t>
-            </a:r>
-            <a:r>
-              <a:rPr b="0" lang="en-IN" sz="4400" spc="-1" strike="noStrike">
-                <a:solidFill>
-                  <a:srgbClr val="000000"/>
-                </a:solidFill>
-                <a:uFill>
-                  <a:solidFill>
-                    <a:srgbClr val="ffffff"/>
-                  </a:solidFill>
-                </a:uFill>
-                <a:latin typeface="Arial"/>
-              </a:rPr>
-              <a:t>at</a:t>
+              <a:t>Click to edit the title text format</a:t>
             </a:r>
             <a:endParaRPr b="0" lang="en-IN" sz="4400" spc="-1" strike="noStrike">
               <a:solidFill>
@@ -10135,13 +10058,6 @@
 <file path=ppt/slideMasters/slideMaster3.xml><?xml version="1.0" encoding="utf-8"?>
 <p:sldMaster xmlns:a="http://schemas.openxmlformats.org/drawingml/2006/main" xmlns:p="http://schemas.openxmlformats.org/presentationml/2006/main" xmlns:r="http://schemas.openxmlformats.org/officeDocument/2006/relationships" xmlns:p14="http://schemas.microsoft.com/office/powerpoint/2010/main" xmlns:p15="http://schemas.microsoft.com/office/powerpoint/2012/main" xmlns:mc="http://schemas.openxmlformats.org/markup-compatibility/2006">
   <p:cSld>
-    <p:bg>
-      <p:bgPr>
-        <a:solidFill>
-          <a:srgbClr val="ffffff"/>
-        </a:solidFill>
-      </p:bgPr>
-    </p:bg>
     <p:spTree>
       <p:nvGrpSpPr>
         <p:cNvPr id="1" name=""/>
@@ -10191,189 +10107,7 @@
                 </a:uFill>
                 <a:latin typeface="Arial"/>
               </a:rPr>
-              <a:t>Cli</a:t>
-            </a:r>
-            <a:r>
-              <a:rPr b="0" lang="en-IN" sz="4400" spc="-1" strike="noStrike">
-                <a:solidFill>
-                  <a:srgbClr val="000000"/>
-                </a:solidFill>
-                <a:uFill>
-                  <a:solidFill>
-                    <a:srgbClr val="ffffff"/>
-                  </a:solidFill>
-                </a:uFill>
-                <a:latin typeface="Arial"/>
-              </a:rPr>
-              <a:t>ck </a:t>
-            </a:r>
-            <a:r>
-              <a:rPr b="0" lang="en-IN" sz="4400" spc="-1" strike="noStrike">
-                <a:solidFill>
-                  <a:srgbClr val="000000"/>
-                </a:solidFill>
-                <a:uFill>
-                  <a:solidFill>
-                    <a:srgbClr val="ffffff"/>
-                  </a:solidFill>
-                </a:uFill>
-                <a:latin typeface="Arial"/>
-              </a:rPr>
-              <a:t>to </a:t>
-            </a:r>
-            <a:r>
-              <a:rPr b="0" lang="en-IN" sz="4400" spc="-1" strike="noStrike">
-                <a:solidFill>
-                  <a:srgbClr val="000000"/>
-                </a:solidFill>
-                <a:uFill>
-                  <a:solidFill>
-                    <a:srgbClr val="ffffff"/>
-                  </a:solidFill>
-                </a:uFill>
-                <a:latin typeface="Arial"/>
-              </a:rPr>
-              <a:t>ed</a:t>
-            </a:r>
-            <a:r>
-              <a:rPr b="0" lang="en-IN" sz="4400" spc="-1" strike="noStrike">
-                <a:solidFill>
-                  <a:srgbClr val="000000"/>
-                </a:solidFill>
-                <a:uFill>
-                  <a:solidFill>
-                    <a:srgbClr val="ffffff"/>
-                  </a:solidFill>
-                </a:uFill>
-                <a:latin typeface="Arial"/>
-              </a:rPr>
-              <a:t>it </a:t>
-            </a:r>
-            <a:r>
-              <a:rPr b="0" lang="en-IN" sz="4400" spc="-1" strike="noStrike">
-                <a:solidFill>
-                  <a:srgbClr val="000000"/>
-                </a:solidFill>
-                <a:uFill>
-                  <a:solidFill>
-                    <a:srgbClr val="ffffff"/>
-                  </a:solidFill>
-                </a:uFill>
-                <a:latin typeface="Arial"/>
-              </a:rPr>
-              <a:t>th</a:t>
-            </a:r>
-            <a:r>
-              <a:rPr b="0" lang="en-IN" sz="4400" spc="-1" strike="noStrike">
-                <a:solidFill>
-                  <a:srgbClr val="000000"/>
-                </a:solidFill>
-                <a:uFill>
-                  <a:solidFill>
-                    <a:srgbClr val="ffffff"/>
-                  </a:solidFill>
-                </a:uFill>
-                <a:latin typeface="Arial"/>
-              </a:rPr>
-              <a:t>e </a:t>
-            </a:r>
-            <a:r>
-              <a:rPr b="0" lang="en-IN" sz="4400" spc="-1" strike="noStrike">
-                <a:solidFill>
-                  <a:srgbClr val="000000"/>
-                </a:solidFill>
-                <a:uFill>
-                  <a:solidFill>
-                    <a:srgbClr val="ffffff"/>
-                  </a:solidFill>
-                </a:uFill>
-                <a:latin typeface="Arial"/>
-              </a:rPr>
-              <a:t>titl</a:t>
-            </a:r>
-            <a:r>
-              <a:rPr b="0" lang="en-IN" sz="4400" spc="-1" strike="noStrike">
-                <a:solidFill>
-                  <a:srgbClr val="000000"/>
-                </a:solidFill>
-                <a:uFill>
-                  <a:solidFill>
-                    <a:srgbClr val="ffffff"/>
-                  </a:solidFill>
-                </a:uFill>
-                <a:latin typeface="Arial"/>
-              </a:rPr>
-              <a:t>e </a:t>
-            </a:r>
-            <a:r>
-              <a:rPr b="0" lang="en-IN" sz="4400" spc="-1" strike="noStrike">
-                <a:solidFill>
-                  <a:srgbClr val="000000"/>
-                </a:solidFill>
-                <a:uFill>
-                  <a:solidFill>
-                    <a:srgbClr val="ffffff"/>
-                  </a:solidFill>
-                </a:uFill>
-                <a:latin typeface="Arial"/>
-              </a:rPr>
-              <a:t>te</a:t>
-            </a:r>
-            <a:r>
-              <a:rPr b="0" lang="en-IN" sz="4400" spc="-1" strike="noStrike">
-                <a:solidFill>
-                  <a:srgbClr val="000000"/>
-                </a:solidFill>
-                <a:uFill>
-                  <a:solidFill>
-                    <a:srgbClr val="ffffff"/>
-                  </a:solidFill>
-                </a:uFill>
-                <a:latin typeface="Arial"/>
-              </a:rPr>
-              <a:t>xt </a:t>
-            </a:r>
-            <a:r>
-              <a:rPr b="0" lang="en-IN" sz="4400" spc="-1" strike="noStrike">
-                <a:solidFill>
-                  <a:srgbClr val="000000"/>
-                </a:solidFill>
-                <a:uFill>
-                  <a:solidFill>
-                    <a:srgbClr val="ffffff"/>
-                  </a:solidFill>
-                </a:uFill>
-                <a:latin typeface="Arial"/>
-              </a:rPr>
-              <a:t>for</a:t>
-            </a:r>
-            <a:r>
-              <a:rPr b="0" lang="en-IN" sz="4400" spc="-1" strike="noStrike">
-                <a:solidFill>
-                  <a:srgbClr val="000000"/>
-                </a:solidFill>
-                <a:uFill>
-                  <a:solidFill>
-                    <a:srgbClr val="ffffff"/>
-                  </a:solidFill>
-                </a:uFill>
-                <a:latin typeface="Arial"/>
-              </a:rPr>
-              <a:t>m</a:t>
-            </a:r>
-            <a:r>
-              <a:rPr b="0" lang="en-IN" sz="4400" spc="-1" strike="noStrike">
-                <a:solidFill>
-                  <a:srgbClr val="000000"/>
-                </a:solidFill>
-                <a:uFill>
-                  <a:solidFill>
-                    <a:srgbClr val="ffffff"/>
-                  </a:solidFill>
-                </a:uFill>
-                <a:latin typeface="Arial"/>
-              </a:rPr>
-              <a:t>at</a:t>
+              <a:t>Click to edit the title text format</a:t>
             </a:r>
             <a:endParaRPr b="0" lang="en-IN" sz="4400" spc="-1" strike="noStrike">
               <a:solidFill>
@@ -11036,6 +10770,488 @@
 <file path=ppt/slideMasters/slideMaster5.xml><?xml version="1.0" encoding="utf-8"?>
 <p:sldMaster xmlns:a="http://schemas.openxmlformats.org/drawingml/2006/main" xmlns:p="http://schemas.openxmlformats.org/presentationml/2006/main" xmlns:r="http://schemas.openxmlformats.org/officeDocument/2006/relationships" xmlns:p14="http://schemas.microsoft.com/office/powerpoint/2010/main" xmlns:p15="http://schemas.microsoft.com/office/powerpoint/2012/main" xmlns:mc="http://schemas.openxmlformats.org/markup-compatibility/2006">
   <p:cSld>
+    <p:spTree>
+      <p:nvGrpSpPr>
+        <p:cNvPr id="1" name=""/>
+        <p:cNvGrpSpPr/>
+        <p:nvPr/>
+      </p:nvGrpSpPr>
+      <p:grpSpPr>
+        <a:xfrm>
+          <a:off x="0" y="0"/>
+          <a:ext cx="0" cy="0"/>
+          <a:chOff x="0" y="0"/>
+          <a:chExt cx="0" cy="0"/>
+        </a:xfrm>
+      </p:grpSpPr>
+      <p:sp>
+        <p:nvSpPr>
+          <p:cNvPr id="148" name="PlaceHolder 1"/>
+          <p:cNvSpPr>
+            <a:spLocks noGrp="1"/>
+          </p:cNvSpPr>
+          <p:nvPr>
+            <p:ph type="title"/>
+          </p:nvPr>
+        </p:nvSpPr>
+        <p:spPr>
+          <a:xfrm>
+            <a:off x="504000" y="301320"/>
+            <a:ext cx="9072000" cy="1261800"/>
+          </a:xfrm>
+          <a:prstGeom prst="rect">
+            <a:avLst/>
+          </a:prstGeom>
+        </p:spPr>
+        <p:txBody>
+          <a:bodyPr lIns="0" rIns="0" tIns="0" bIns="0" anchor="ctr"/>
+          <a:p>
+            <a:pPr algn="ctr"/>
+            <a:r>
+              <a:rPr b="0" lang="en-IN" sz="4400" spc="-1" strike="noStrike">
+                <a:solidFill>
+                  <a:srgbClr val="000000"/>
+                </a:solidFill>
+                <a:uFill>
+                  <a:solidFill>
+                    <a:srgbClr val="ffffff"/>
+                  </a:solidFill>
+                </a:uFill>
+                <a:latin typeface="Arial"/>
+              </a:rPr>
+              <a:t>Cli</a:t>
+            </a:r>
+            <a:r>
+              <a:rPr b="0" lang="en-IN" sz="4400" spc="-1" strike="noStrike">
+                <a:solidFill>
+                  <a:srgbClr val="000000"/>
+                </a:solidFill>
+                <a:uFill>
+                  <a:solidFill>
+                    <a:srgbClr val="ffffff"/>
+                  </a:solidFill>
+                </a:uFill>
+                <a:latin typeface="Arial"/>
+              </a:rPr>
+              <a:t>ck </a:t>
+            </a:r>
+            <a:r>
+              <a:rPr b="0" lang="en-IN" sz="4400" spc="-1" strike="noStrike">
+                <a:solidFill>
+                  <a:srgbClr val="000000"/>
+                </a:solidFill>
+                <a:uFill>
+                  <a:solidFill>
+                    <a:srgbClr val="ffffff"/>
+                  </a:solidFill>
+                </a:uFill>
+                <a:latin typeface="Arial"/>
+              </a:rPr>
+              <a:t>to </a:t>
+            </a:r>
+            <a:r>
+              <a:rPr b="0" lang="en-IN" sz="4400" spc="-1" strike="noStrike">
+                <a:solidFill>
+                  <a:srgbClr val="000000"/>
+                </a:solidFill>
+                <a:uFill>
+                  <a:solidFill>
+                    <a:srgbClr val="ffffff"/>
+                  </a:solidFill>
+                </a:uFill>
+                <a:latin typeface="Arial"/>
+              </a:rPr>
+              <a:t>edit </a:t>
+            </a:r>
+            <a:r>
+              <a:rPr b="0" lang="en-IN" sz="4400" spc="-1" strike="noStrike">
+                <a:solidFill>
+                  <a:srgbClr val="000000"/>
+                </a:solidFill>
+                <a:uFill>
+                  <a:solidFill>
+                    <a:srgbClr val="ffffff"/>
+                  </a:solidFill>
+                </a:uFill>
+                <a:latin typeface="Arial"/>
+              </a:rPr>
+              <a:t>the </a:t>
+            </a:r>
+            <a:r>
+              <a:rPr b="0" lang="en-IN" sz="4400" spc="-1" strike="noStrike">
+                <a:solidFill>
+                  <a:srgbClr val="000000"/>
+                </a:solidFill>
+                <a:uFill>
+                  <a:solidFill>
+                    <a:srgbClr val="ffffff"/>
+                  </a:solidFill>
+                </a:uFill>
+                <a:latin typeface="Arial"/>
+              </a:rPr>
+              <a:t>title </a:t>
+            </a:r>
+            <a:r>
+              <a:rPr b="0" lang="en-IN" sz="4400" spc="-1" strike="noStrike">
+                <a:solidFill>
+                  <a:srgbClr val="000000"/>
+                </a:solidFill>
+                <a:uFill>
+                  <a:solidFill>
+                    <a:srgbClr val="ffffff"/>
+                  </a:solidFill>
+                </a:uFill>
+                <a:latin typeface="Arial"/>
+              </a:rPr>
+              <a:t>text </a:t>
+            </a:r>
+            <a:r>
+              <a:rPr b="0" lang="en-IN" sz="4400" spc="-1" strike="noStrike">
+                <a:solidFill>
+                  <a:srgbClr val="000000"/>
+                </a:solidFill>
+                <a:uFill>
+                  <a:solidFill>
+                    <a:srgbClr val="ffffff"/>
+                  </a:solidFill>
+                </a:uFill>
+                <a:latin typeface="Arial"/>
+              </a:rPr>
+              <a:t>for</a:t>
+            </a:r>
+            <a:r>
+              <a:rPr b="0" lang="en-IN" sz="4400" spc="-1" strike="noStrike">
+                <a:solidFill>
+                  <a:srgbClr val="000000"/>
+                </a:solidFill>
+                <a:uFill>
+                  <a:solidFill>
+                    <a:srgbClr val="ffffff"/>
+                  </a:solidFill>
+                </a:uFill>
+                <a:latin typeface="Arial"/>
+              </a:rPr>
+              <a:t>ma</a:t>
+            </a:r>
+            <a:r>
+              <a:rPr b="0" lang="en-IN" sz="4400" spc="-1" strike="noStrike">
+                <a:solidFill>
+                  <a:srgbClr val="000000"/>
+                </a:solidFill>
+                <a:uFill>
+                  <a:solidFill>
+                    <a:srgbClr val="ffffff"/>
+                  </a:solidFill>
+                </a:uFill>
+                <a:latin typeface="Arial"/>
+              </a:rPr>
+              <a:t>t</a:t>
+            </a:r>
+            <a:endParaRPr b="0" lang="en-IN" sz="4400" spc="-1" strike="noStrike">
+              <a:solidFill>
+                <a:srgbClr val="000000"/>
+              </a:solidFill>
+              <a:uFill>
+                <a:solidFill>
+                  <a:srgbClr val="ffffff"/>
+                </a:solidFill>
+              </a:uFill>
+              <a:latin typeface="Arial"/>
+            </a:endParaRPr>
+          </a:p>
+        </p:txBody>
+      </p:sp>
+      <p:sp>
+        <p:nvSpPr>
+          <p:cNvPr id="149" name="PlaceHolder 2"/>
+          <p:cNvSpPr>
+            <a:spLocks noGrp="1"/>
+          </p:cNvSpPr>
+          <p:nvPr>
+            <p:ph type="body"/>
+          </p:nvPr>
+        </p:nvSpPr>
+        <p:spPr>
+          <a:xfrm>
+            <a:off x="504000" y="1768680"/>
+            <a:ext cx="9072000" cy="4384080"/>
+          </a:xfrm>
+          <a:prstGeom prst="rect">
+            <a:avLst/>
+          </a:prstGeom>
+        </p:spPr>
+        <p:txBody>
+          <a:bodyPr lIns="0" rIns="0" tIns="0" bIns="0"/>
+          <a:p>
+            <a:pPr marL="432000" indent="-324000">
+              <a:buClr>
+                <a:srgbClr val="000000"/>
+              </a:buClr>
+              <a:buSzPct val="45000"/>
+              <a:buFont typeface="Wingdings" charset="2"/>
+              <a:buChar char=""/>
+            </a:pPr>
+            <a:r>
+              <a:rPr b="0" lang="en-IN" sz="3200" spc="-1" strike="noStrike">
+                <a:solidFill>
+                  <a:srgbClr val="000000"/>
+                </a:solidFill>
+                <a:uFill>
+                  <a:solidFill>
+                    <a:srgbClr val="ffffff"/>
+                  </a:solidFill>
+                </a:uFill>
+                <a:latin typeface="Arial"/>
+              </a:rPr>
+              <a:t>Click to edit the outline text format</a:t>
+            </a:r>
+            <a:endParaRPr b="0" lang="en-IN" sz="3200" spc="-1" strike="noStrike">
+              <a:solidFill>
+                <a:srgbClr val="000000"/>
+              </a:solidFill>
+              <a:uFill>
+                <a:solidFill>
+                  <a:srgbClr val="ffffff"/>
+                </a:solidFill>
+              </a:uFill>
+              <a:latin typeface="Arial"/>
+            </a:endParaRPr>
+          </a:p>
+          <a:p>
+            <a:pPr lvl="1" marL="864000" indent="-324000">
+              <a:buClr>
+                <a:srgbClr val="000000"/>
+              </a:buClr>
+              <a:buSzPct val="75000"/>
+              <a:buFont typeface="Symbol" charset="2"/>
+              <a:buChar char=""/>
+            </a:pPr>
+            <a:r>
+              <a:rPr b="0" lang="en-IN" sz="2800" spc="-1" strike="noStrike">
+                <a:solidFill>
+                  <a:srgbClr val="000000"/>
+                </a:solidFill>
+                <a:uFill>
+                  <a:solidFill>
+                    <a:srgbClr val="ffffff"/>
+                  </a:solidFill>
+                </a:uFill>
+                <a:latin typeface="Arial"/>
+              </a:rPr>
+              <a:t>Second Outline Level</a:t>
+            </a:r>
+            <a:endParaRPr b="0" lang="en-IN" sz="2800" spc="-1" strike="noStrike">
+              <a:solidFill>
+                <a:srgbClr val="000000"/>
+              </a:solidFill>
+              <a:uFill>
+                <a:solidFill>
+                  <a:srgbClr val="ffffff"/>
+                </a:solidFill>
+              </a:uFill>
+              <a:latin typeface="Arial"/>
+            </a:endParaRPr>
+          </a:p>
+          <a:p>
+            <a:pPr lvl="2" marL="1296000" indent="-288000">
+              <a:buClr>
+                <a:srgbClr val="000000"/>
+              </a:buClr>
+              <a:buSzPct val="45000"/>
+              <a:buFont typeface="Wingdings" charset="2"/>
+              <a:buChar char=""/>
+            </a:pPr>
+            <a:r>
+              <a:rPr b="0" lang="en-IN" sz="2400" spc="-1" strike="noStrike">
+                <a:solidFill>
+                  <a:srgbClr val="000000"/>
+                </a:solidFill>
+                <a:uFill>
+                  <a:solidFill>
+                    <a:srgbClr val="ffffff"/>
+                  </a:solidFill>
+                </a:uFill>
+                <a:latin typeface="Arial"/>
+              </a:rPr>
+              <a:t>Third Outline Level</a:t>
+            </a:r>
+            <a:endParaRPr b="0" lang="en-IN" sz="2400" spc="-1" strike="noStrike">
+              <a:solidFill>
+                <a:srgbClr val="000000"/>
+              </a:solidFill>
+              <a:uFill>
+                <a:solidFill>
+                  <a:srgbClr val="ffffff"/>
+                </a:solidFill>
+              </a:uFill>
+              <a:latin typeface="Arial"/>
+            </a:endParaRPr>
+          </a:p>
+          <a:p>
+            <a:pPr lvl="3" marL="1728000" indent="-216000">
+              <a:buClr>
+                <a:srgbClr val="000000"/>
+              </a:buClr>
+              <a:buSzPct val="75000"/>
+              <a:buFont typeface="Symbol" charset="2"/>
+              <a:buChar char=""/>
+            </a:pPr>
+            <a:r>
+              <a:rPr b="0" lang="en-IN" sz="2000" spc="-1" strike="noStrike">
+                <a:solidFill>
+                  <a:srgbClr val="000000"/>
+                </a:solidFill>
+                <a:uFill>
+                  <a:solidFill>
+                    <a:srgbClr val="ffffff"/>
+                  </a:solidFill>
+                </a:uFill>
+                <a:latin typeface="Arial"/>
+              </a:rPr>
+              <a:t>Fourth Outline Level</a:t>
+            </a:r>
+            <a:endParaRPr b="0" lang="en-IN" sz="2000" spc="-1" strike="noStrike">
+              <a:solidFill>
+                <a:srgbClr val="000000"/>
+              </a:solidFill>
+              <a:uFill>
+                <a:solidFill>
+                  <a:srgbClr val="ffffff"/>
+                </a:solidFill>
+              </a:uFill>
+              <a:latin typeface="Arial"/>
+            </a:endParaRPr>
+          </a:p>
+          <a:p>
+            <a:pPr lvl="4" marL="2160000" indent="-216000">
+              <a:buClr>
+                <a:srgbClr val="000000"/>
+              </a:buClr>
+              <a:buSzPct val="45000"/>
+              <a:buFont typeface="Wingdings" charset="2"/>
+              <a:buChar char=""/>
+            </a:pPr>
+            <a:r>
+              <a:rPr b="0" lang="en-IN" sz="2000" spc="-1" strike="noStrike">
+                <a:solidFill>
+                  <a:srgbClr val="000000"/>
+                </a:solidFill>
+                <a:uFill>
+                  <a:solidFill>
+                    <a:srgbClr val="ffffff"/>
+                  </a:solidFill>
+                </a:uFill>
+                <a:latin typeface="Arial"/>
+              </a:rPr>
+              <a:t>Fifth Outline Level</a:t>
+            </a:r>
+            <a:endParaRPr b="0" lang="en-IN" sz="2000" spc="-1" strike="noStrike">
+              <a:solidFill>
+                <a:srgbClr val="000000"/>
+              </a:solidFill>
+              <a:uFill>
+                <a:solidFill>
+                  <a:srgbClr val="ffffff"/>
+                </a:solidFill>
+              </a:uFill>
+              <a:latin typeface="Arial"/>
+            </a:endParaRPr>
+          </a:p>
+          <a:p>
+            <a:pPr lvl="5" marL="2592000" indent="-216000">
+              <a:buClr>
+                <a:srgbClr val="000000"/>
+              </a:buClr>
+              <a:buSzPct val="45000"/>
+              <a:buFont typeface="Wingdings" charset="2"/>
+              <a:buChar char=""/>
+            </a:pPr>
+            <a:r>
+              <a:rPr b="0" lang="en-IN" sz="2000" spc="-1" strike="noStrike">
+                <a:solidFill>
+                  <a:srgbClr val="000000"/>
+                </a:solidFill>
+                <a:uFill>
+                  <a:solidFill>
+                    <a:srgbClr val="ffffff"/>
+                  </a:solidFill>
+                </a:uFill>
+                <a:latin typeface="Arial"/>
+              </a:rPr>
+              <a:t>Sixth Outline Level</a:t>
+            </a:r>
+            <a:endParaRPr b="0" lang="en-IN" sz="2000" spc="-1" strike="noStrike">
+              <a:solidFill>
+                <a:srgbClr val="000000"/>
+              </a:solidFill>
+              <a:uFill>
+                <a:solidFill>
+                  <a:srgbClr val="ffffff"/>
+                </a:solidFill>
+              </a:uFill>
+              <a:latin typeface="Arial"/>
+            </a:endParaRPr>
+          </a:p>
+          <a:p>
+            <a:pPr lvl="6" marL="3024000" indent="-216000">
+              <a:buClr>
+                <a:srgbClr val="000000"/>
+              </a:buClr>
+              <a:buSzPct val="45000"/>
+              <a:buFont typeface="Wingdings" charset="2"/>
+              <a:buChar char=""/>
+            </a:pPr>
+            <a:r>
+              <a:rPr b="0" lang="en-IN" sz="2000" spc="-1" strike="noStrike">
+                <a:solidFill>
+                  <a:srgbClr val="000000"/>
+                </a:solidFill>
+                <a:uFill>
+                  <a:solidFill>
+                    <a:srgbClr val="ffffff"/>
+                  </a:solidFill>
+                </a:uFill>
+                <a:latin typeface="Arial"/>
+              </a:rPr>
+              <a:t>Seventh Outline Level</a:t>
+            </a:r>
+            <a:endParaRPr b="0" lang="en-IN" sz="2000" spc="-1" strike="noStrike">
+              <a:solidFill>
+                <a:srgbClr val="000000"/>
+              </a:solidFill>
+              <a:uFill>
+                <a:solidFill>
+                  <a:srgbClr val="ffffff"/>
+                </a:solidFill>
+              </a:uFill>
+              <a:latin typeface="Arial"/>
+            </a:endParaRPr>
+          </a:p>
+        </p:txBody>
+      </p:sp>
+    </p:spTree>
+  </p:cSld>
+  <p:clrMap bg1="lt1" bg2="lt2" tx1="dk1" tx2="dk2" accent1="accent1" accent2="accent2" accent3="accent3" accent4="accent4" accent5="accent5" accent6="accent6" hlink="hlink" folHlink="folHlink"/>
+  <p:sldLayoutIdLst>
+    <p:sldLayoutId id="2147483701" r:id="rId2"/>
+    <p:sldLayoutId id="2147483702" r:id="rId3"/>
+    <p:sldLayoutId id="2147483703" r:id="rId4"/>
+    <p:sldLayoutId id="2147483704" r:id="rId5"/>
+    <p:sldLayoutId id="2147483705" r:id="rId6"/>
+    <p:sldLayoutId id="2147483706" r:id="rId7"/>
+    <p:sldLayoutId id="2147483707" r:id="rId8"/>
+    <p:sldLayoutId id="2147483708" r:id="rId9"/>
+    <p:sldLayoutId id="2147483709" r:id="rId10"/>
+    <p:sldLayoutId id="2147483710" r:id="rId11"/>
+    <p:sldLayoutId id="2147483711" r:id="rId12"/>
+    <p:sldLayoutId id="2147483712" r:id="rId13"/>
+  </p:sldLayoutIdLst>
+</p:sldMaster>
+</file>
+
+<file path=ppt/slideMasters/slideMaster6.xml><?xml version="1.0" encoding="utf-8"?>
+<p:sldMaster xmlns:a="http://schemas.openxmlformats.org/drawingml/2006/main" xmlns:p="http://schemas.openxmlformats.org/presentationml/2006/main" xmlns:r="http://schemas.openxmlformats.org/officeDocument/2006/relationships" xmlns:p14="http://schemas.microsoft.com/office/powerpoint/2010/main" xmlns:p15="http://schemas.microsoft.com/office/powerpoint/2012/main" xmlns:mc="http://schemas.openxmlformats.org/markup-compatibility/2006">
+  <p:cSld>
     <p:bg>
       <p:bgPr>
         <a:solidFill>
@@ -11059,7 +11275,7 @@
       </p:grpSpPr>
       <p:pic>
         <p:nvPicPr>
-          <p:cNvPr id="148" name="图片 9" descr=""/>
+          <p:cNvPr id="184" name="图片 9" descr=""/>
           <p:cNvPicPr/>
           <p:nvPr/>
         </p:nvPicPr>
@@ -11070,7 +11286,7 @@
         <p:spPr>
           <a:xfrm>
             <a:off x="360" y="1440"/>
-            <a:ext cx="10073880" cy="7557480"/>
+            <a:ext cx="10073160" cy="7556760"/>
           </a:xfrm>
           <a:prstGeom prst="rect">
             <a:avLst/>
@@ -11082,14 +11298,14 @@
       </p:pic>
       <p:sp>
         <p:nvSpPr>
-          <p:cNvPr id="149" name="CustomShape 1"/>
+          <p:cNvPr id="185" name="CustomShape 1"/>
           <p:cNvSpPr/>
           <p:nvPr/>
         </p:nvSpPr>
         <p:spPr>
           <a:xfrm>
             <a:off x="360" y="4132440"/>
-            <a:ext cx="10077840" cy="3424680"/>
+            <a:ext cx="10077120" cy="3423960"/>
           </a:xfrm>
           <a:prstGeom prst="rect">
             <a:avLst/>
@@ -11110,14 +11326,14 @@
       </p:sp>
       <p:sp>
         <p:nvSpPr>
-          <p:cNvPr id="150" name="CustomShape 2"/>
+          <p:cNvPr id="186" name="CustomShape 2"/>
           <p:cNvSpPr/>
           <p:nvPr/>
         </p:nvSpPr>
         <p:spPr>
           <a:xfrm>
             <a:off x="3612600" y="2994480"/>
-            <a:ext cx="3238200" cy="819360"/>
+            <a:ext cx="3237480" cy="818640"/>
           </a:xfrm>
           <a:prstGeom prst="rect">
             <a:avLst/>
@@ -11172,14 +11388,14 @@
       </p:sp>
       <p:sp>
         <p:nvSpPr>
-          <p:cNvPr id="151" name="CustomShape 3"/>
+          <p:cNvPr id="187" name="CustomShape 3"/>
           <p:cNvSpPr/>
           <p:nvPr/>
         </p:nvSpPr>
         <p:spPr>
           <a:xfrm>
             <a:off x="3612600" y="2586960"/>
-            <a:ext cx="3238200" cy="819360"/>
+            <a:ext cx="3237480" cy="818640"/>
           </a:xfrm>
           <a:prstGeom prst="rect">
             <a:avLst/>
@@ -11234,7 +11450,7 @@
       </p:sp>
       <p:pic>
         <p:nvPicPr>
-          <p:cNvPr id="152" name="图片 8" descr=""/>
+          <p:cNvPr id="188" name="图片 8" descr=""/>
           <p:cNvPicPr/>
           <p:nvPr/>
         </p:nvPicPr>
@@ -11246,7 +11462,7 @@
         <p:spPr>
           <a:xfrm>
             <a:off x="113040" y="390240"/>
-            <a:ext cx="1560600" cy="538560"/>
+            <a:ext cx="1559880" cy="537840"/>
           </a:xfrm>
           <a:prstGeom prst="rect">
             <a:avLst/>
@@ -11258,7 +11474,7 @@
       </p:pic>
       <p:pic>
         <p:nvPicPr>
-          <p:cNvPr id="153" name="图片 10" descr=""/>
+          <p:cNvPr id="189" name="图片 10" descr=""/>
           <p:cNvPicPr/>
           <p:nvPr/>
         </p:nvPicPr>
@@ -11269,7 +11485,7 @@
         <p:spPr>
           <a:xfrm>
             <a:off x="0" y="4998240"/>
-            <a:ext cx="10077840" cy="2560320"/>
+            <a:ext cx="10077120" cy="2559600"/>
           </a:xfrm>
           <a:prstGeom prst="rect">
             <a:avLst/>
@@ -11281,7 +11497,7 @@
       </p:pic>
       <p:sp>
         <p:nvSpPr>
-          <p:cNvPr id="154" name="PlaceHolder 4"/>
+          <p:cNvPr id="190" name="PlaceHolder 4"/>
           <p:cNvSpPr>
             <a:spLocks noGrp="1"/>
           </p:cNvSpPr>
@@ -11314,7 +11530,49 @@
                 </a:uFill>
                 <a:latin typeface="Arial"/>
               </a:rPr>
-              <a:t>Click to edit the title text format</a:t>
+              <a:t>Click to </a:t>
+            </a:r>
+            <a:r>
+              <a:rPr b="0" lang="en-IN" sz="4400" spc="-1" strike="noStrike">
+                <a:solidFill>
+                  <a:srgbClr val="000000"/>
+                </a:solidFill>
+                <a:uFill>
+                  <a:solidFill>
+                    <a:srgbClr val="ffffff"/>
+                  </a:solidFill>
+                </a:uFill>
+                <a:latin typeface="Arial"/>
+              </a:rPr>
+              <a:t>edit the </a:t>
+            </a:r>
+            <a:r>
+              <a:rPr b="0" lang="en-IN" sz="4400" spc="-1" strike="noStrike">
+                <a:solidFill>
+                  <a:srgbClr val="000000"/>
+                </a:solidFill>
+                <a:uFill>
+                  <a:solidFill>
+                    <a:srgbClr val="ffffff"/>
+                  </a:solidFill>
+                </a:uFill>
+                <a:latin typeface="Arial"/>
+              </a:rPr>
+              <a:t>title text </a:t>
+            </a:r>
+            <a:r>
+              <a:rPr b="0" lang="en-IN" sz="4400" spc="-1" strike="noStrike">
+                <a:solidFill>
+                  <a:srgbClr val="000000"/>
+                </a:solidFill>
+                <a:uFill>
+                  <a:solidFill>
+                    <a:srgbClr val="ffffff"/>
+                  </a:solidFill>
+                </a:uFill>
+                <a:latin typeface="Arial"/>
+              </a:rPr>
+              <a:t>format</a:t>
             </a:r>
             <a:endParaRPr b="0" lang="en-IN" sz="4400" spc="-1" strike="noStrike">
               <a:solidFill>
@@ -11332,7 +11590,7 @@
       </p:sp>
       <p:sp>
         <p:nvSpPr>
-          <p:cNvPr id="155" name="PlaceHolder 5"/>
+          <p:cNvPr id="191" name="PlaceHolder 5"/>
           <p:cNvSpPr>
             <a:spLocks noGrp="1"/>
           </p:cNvSpPr>
@@ -11602,374 +11860,18 @@
   </p:cSld>
   <p:clrMap bg1="lt1" bg2="lt2" tx1="dk1" tx2="dk2" accent1="accent1" accent2="accent2" accent3="accent3" accent4="accent4" accent5="accent5" accent6="accent6" hlink="hlink" folHlink="folHlink"/>
   <p:sldLayoutIdLst>
-    <p:sldLayoutId id="2147483701" r:id="rId5"/>
-    <p:sldLayoutId id="2147483702" r:id="rId6"/>
-    <p:sldLayoutId id="2147483703" r:id="rId7"/>
-    <p:sldLayoutId id="2147483704" r:id="rId8"/>
-    <p:sldLayoutId id="2147483705" r:id="rId9"/>
-    <p:sldLayoutId id="2147483706" r:id="rId10"/>
-    <p:sldLayoutId id="2147483707" r:id="rId11"/>
-    <p:sldLayoutId id="2147483708" r:id="rId12"/>
-    <p:sldLayoutId id="2147483709" r:id="rId13"/>
-    <p:sldLayoutId id="2147483710" r:id="rId14"/>
-    <p:sldLayoutId id="2147483711" r:id="rId15"/>
-    <p:sldLayoutId id="2147483712" r:id="rId16"/>
-  </p:sldLayoutIdLst>
-</p:sldMaster>
-</file>
-
-<file path=ppt/slideMasters/slideMaster6.xml><?xml version="1.0" encoding="utf-8"?>
-<p:sldMaster xmlns:a="http://schemas.openxmlformats.org/drawingml/2006/main" xmlns:p="http://schemas.openxmlformats.org/presentationml/2006/main" xmlns:r="http://schemas.openxmlformats.org/officeDocument/2006/relationships" xmlns:p14="http://schemas.microsoft.com/office/powerpoint/2010/main" xmlns:p15="http://schemas.microsoft.com/office/powerpoint/2012/main" xmlns:mc="http://schemas.openxmlformats.org/markup-compatibility/2006">
-  <p:cSld>
-    <p:spTree>
-      <p:nvGrpSpPr>
-        <p:cNvPr id="1" name=""/>
-        <p:cNvGrpSpPr/>
-        <p:nvPr/>
-      </p:nvGrpSpPr>
-      <p:grpSpPr>
-        <a:xfrm>
-          <a:off x="0" y="0"/>
-          <a:ext cx="0" cy="0"/>
-          <a:chOff x="0" y="0"/>
-          <a:chExt cx="0" cy="0"/>
-        </a:xfrm>
-      </p:grpSpPr>
-      <p:sp>
-        <p:nvSpPr>
-          <p:cNvPr id="190" name="PlaceHolder 1"/>
-          <p:cNvSpPr>
-            <a:spLocks noGrp="1"/>
-          </p:cNvSpPr>
-          <p:nvPr>
-            <p:ph type="title"/>
-          </p:nvPr>
-        </p:nvSpPr>
-        <p:spPr>
-          <a:xfrm>
-            <a:off x="504000" y="301320"/>
-            <a:ext cx="9072000" cy="1261800"/>
-          </a:xfrm>
-          <a:prstGeom prst="rect">
-            <a:avLst/>
-          </a:prstGeom>
-        </p:spPr>
-        <p:txBody>
-          <a:bodyPr lIns="0" rIns="0" tIns="0" bIns="0" anchor="ctr"/>
-          <a:p>
-            <a:pPr algn="ctr"/>
-            <a:r>
-              <a:rPr b="0" lang="en-IN" sz="4400" spc="-1" strike="noStrike">
-                <a:solidFill>
-                  <a:srgbClr val="000000"/>
-                </a:solidFill>
-                <a:uFill>
-                  <a:solidFill>
-                    <a:srgbClr val="ffffff"/>
-                  </a:solidFill>
-                </a:uFill>
-                <a:latin typeface="Arial"/>
-              </a:rPr>
-              <a:t>Click to edit the title text format</a:t>
-            </a:r>
-            <a:endParaRPr b="0" lang="en-IN" sz="4400" spc="-1" strike="noStrike">
-              <a:solidFill>
-                <a:srgbClr val="000000"/>
-              </a:solidFill>
-              <a:uFill>
-                <a:solidFill>
-                  <a:srgbClr val="ffffff"/>
-                </a:solidFill>
-              </a:uFill>
-              <a:latin typeface="Arial"/>
-            </a:endParaRPr>
-          </a:p>
-        </p:txBody>
-      </p:sp>
-      <p:sp>
-        <p:nvSpPr>
-          <p:cNvPr id="191" name="PlaceHolder 2"/>
-          <p:cNvSpPr>
-            <a:spLocks noGrp="1"/>
-          </p:cNvSpPr>
-          <p:nvPr>
-            <p:ph type="body"/>
-          </p:nvPr>
-        </p:nvSpPr>
-        <p:spPr>
-          <a:xfrm>
-            <a:off x="504000" y="1768680"/>
-            <a:ext cx="9072000" cy="4384080"/>
-          </a:xfrm>
-          <a:prstGeom prst="rect">
-            <a:avLst/>
-          </a:prstGeom>
-        </p:spPr>
-        <p:txBody>
-          <a:bodyPr lIns="0" rIns="0" tIns="0" bIns="0"/>
-          <a:p>
-            <a:pPr marL="432000" indent="-324000">
-              <a:buClr>
-                <a:srgbClr val="000000"/>
-              </a:buClr>
-              <a:buSzPct val="45000"/>
-              <a:buFont typeface="Wingdings" charset="2"/>
-              <a:buChar char=""/>
-            </a:pPr>
-            <a:r>
-              <a:rPr b="0" lang="en-IN" sz="3200" spc="-1" strike="noStrike">
-                <a:solidFill>
-                  <a:srgbClr val="000000"/>
-                </a:solidFill>
-                <a:uFill>
-                  <a:solidFill>
-                    <a:srgbClr val="ffffff"/>
-                  </a:solidFill>
-                </a:uFill>
-                <a:latin typeface="Arial"/>
-              </a:rPr>
-              <a:t>Click to edit the outline text format</a:t>
-            </a:r>
-            <a:endParaRPr b="0" lang="en-IN" sz="3200" spc="-1" strike="noStrike">
-              <a:solidFill>
-                <a:srgbClr val="000000"/>
-              </a:solidFill>
-              <a:uFill>
-                <a:solidFill>
-                  <a:srgbClr val="ffffff"/>
-                </a:solidFill>
-              </a:uFill>
-              <a:latin typeface="Arial"/>
-            </a:endParaRPr>
-          </a:p>
-          <a:p>
-            <a:pPr lvl="1" marL="864000" indent="-324000">
-              <a:buClr>
-                <a:srgbClr val="000000"/>
-              </a:buClr>
-              <a:buSzPct val="75000"/>
-              <a:buFont typeface="Symbol" charset="2"/>
-              <a:buChar char=""/>
-            </a:pPr>
-            <a:r>
-              <a:rPr b="0" lang="en-IN" sz="2800" spc="-1" strike="noStrike">
-                <a:solidFill>
-                  <a:srgbClr val="000000"/>
-                </a:solidFill>
-                <a:uFill>
-                  <a:solidFill>
-                    <a:srgbClr val="ffffff"/>
-                  </a:solidFill>
-                </a:uFill>
-                <a:latin typeface="Arial"/>
-              </a:rPr>
-              <a:t>Second Outline Level</a:t>
-            </a:r>
-            <a:endParaRPr b="0" lang="en-IN" sz="2800" spc="-1" strike="noStrike">
-              <a:solidFill>
-                <a:srgbClr val="000000"/>
-              </a:solidFill>
-              <a:uFill>
-                <a:solidFill>
-                  <a:srgbClr val="ffffff"/>
-                </a:solidFill>
-              </a:uFill>
-              <a:latin typeface="Arial"/>
-            </a:endParaRPr>
-          </a:p>
-          <a:p>
-            <a:pPr lvl="2" marL="1296000" indent="-288000">
-              <a:buClr>
-                <a:srgbClr val="000000"/>
-              </a:buClr>
-              <a:buSzPct val="45000"/>
-              <a:buFont typeface="Wingdings" charset="2"/>
-              <a:buChar char=""/>
-            </a:pPr>
-            <a:r>
-              <a:rPr b="0" lang="en-IN" sz="2400" spc="-1" strike="noStrike">
-                <a:solidFill>
-                  <a:srgbClr val="000000"/>
-                </a:solidFill>
-                <a:uFill>
-                  <a:solidFill>
-                    <a:srgbClr val="ffffff"/>
-                  </a:solidFill>
-                </a:uFill>
-                <a:latin typeface="Arial"/>
-              </a:rPr>
-              <a:t>Third Outline Level</a:t>
-            </a:r>
-            <a:endParaRPr b="0" lang="en-IN" sz="2400" spc="-1" strike="noStrike">
-              <a:solidFill>
-                <a:srgbClr val="000000"/>
-              </a:solidFill>
-              <a:uFill>
-                <a:solidFill>
-                  <a:srgbClr val="ffffff"/>
-                </a:solidFill>
-              </a:uFill>
-              <a:latin typeface="Arial"/>
-            </a:endParaRPr>
-          </a:p>
-          <a:p>
-            <a:pPr lvl="3" marL="1728000" indent="-216000">
-              <a:buClr>
-                <a:srgbClr val="000000"/>
-              </a:buClr>
-              <a:buSzPct val="75000"/>
-              <a:buFont typeface="Symbol" charset="2"/>
-              <a:buChar char=""/>
-            </a:pPr>
-            <a:r>
-              <a:rPr b="0" lang="en-IN" sz="2000" spc="-1" strike="noStrike">
-                <a:solidFill>
-                  <a:srgbClr val="000000"/>
-                </a:solidFill>
-                <a:uFill>
-                  <a:solidFill>
-                    <a:srgbClr val="ffffff"/>
-                  </a:solidFill>
-                </a:uFill>
-                <a:latin typeface="Arial"/>
-              </a:rPr>
-              <a:t>Fourth Outline Level</a:t>
-            </a:r>
-            <a:endParaRPr b="0" lang="en-IN" sz="2000" spc="-1" strike="noStrike">
-              <a:solidFill>
-                <a:srgbClr val="000000"/>
-              </a:solidFill>
-              <a:uFill>
-                <a:solidFill>
-                  <a:srgbClr val="ffffff"/>
-                </a:solidFill>
-              </a:uFill>
-              <a:latin typeface="Arial"/>
-            </a:endParaRPr>
-          </a:p>
-          <a:p>
-            <a:pPr lvl="4" marL="2160000" indent="-216000">
-              <a:buClr>
-                <a:srgbClr val="000000"/>
-              </a:buClr>
-              <a:buSzPct val="45000"/>
-              <a:buFont typeface="Wingdings" charset="2"/>
-              <a:buChar char=""/>
-            </a:pPr>
-            <a:r>
-              <a:rPr b="0" lang="en-IN" sz="2000" spc="-1" strike="noStrike">
-                <a:solidFill>
-                  <a:srgbClr val="000000"/>
-                </a:solidFill>
-                <a:uFill>
-                  <a:solidFill>
-                    <a:srgbClr val="ffffff"/>
-                  </a:solidFill>
-                </a:uFill>
-                <a:latin typeface="Arial"/>
-              </a:rPr>
-              <a:t>Fifth Outline Level</a:t>
-            </a:r>
-            <a:endParaRPr b="0" lang="en-IN" sz="2000" spc="-1" strike="noStrike">
-              <a:solidFill>
-                <a:srgbClr val="000000"/>
-              </a:solidFill>
-              <a:uFill>
-                <a:solidFill>
-                  <a:srgbClr val="ffffff"/>
-                </a:solidFill>
-              </a:uFill>
-              <a:latin typeface="Arial"/>
-            </a:endParaRPr>
-          </a:p>
-          <a:p>
-            <a:pPr lvl="5" marL="2592000" indent="-216000">
-              <a:buClr>
-                <a:srgbClr val="000000"/>
-              </a:buClr>
-              <a:buSzPct val="45000"/>
-              <a:buFont typeface="Wingdings" charset="2"/>
-              <a:buChar char=""/>
-            </a:pPr>
-            <a:r>
-              <a:rPr b="0" lang="en-IN" sz="2000" spc="-1" strike="noStrike">
-                <a:solidFill>
-                  <a:srgbClr val="000000"/>
-                </a:solidFill>
-                <a:uFill>
-                  <a:solidFill>
-                    <a:srgbClr val="ffffff"/>
-                  </a:solidFill>
-                </a:uFill>
-                <a:latin typeface="Arial"/>
-              </a:rPr>
-              <a:t>Sixth Outline Level</a:t>
-            </a:r>
-            <a:endParaRPr b="0" lang="en-IN" sz="2000" spc="-1" strike="noStrike">
-              <a:solidFill>
-                <a:srgbClr val="000000"/>
-              </a:solidFill>
-              <a:uFill>
-                <a:solidFill>
-                  <a:srgbClr val="ffffff"/>
-                </a:solidFill>
-              </a:uFill>
-              <a:latin typeface="Arial"/>
-            </a:endParaRPr>
-          </a:p>
-          <a:p>
-            <a:pPr lvl="6" marL="3024000" indent="-216000">
-              <a:buClr>
-                <a:srgbClr val="000000"/>
-              </a:buClr>
-              <a:buSzPct val="45000"/>
-              <a:buFont typeface="Wingdings" charset="2"/>
-              <a:buChar char=""/>
-            </a:pPr>
-            <a:r>
-              <a:rPr b="0" lang="en-IN" sz="2000" spc="-1" strike="noStrike">
-                <a:solidFill>
-                  <a:srgbClr val="000000"/>
-                </a:solidFill>
-                <a:uFill>
-                  <a:solidFill>
-                    <a:srgbClr val="ffffff"/>
-                  </a:solidFill>
-                </a:uFill>
-                <a:latin typeface="Arial"/>
-              </a:rPr>
-              <a:t>Seventh Outline Level</a:t>
-            </a:r>
-            <a:endParaRPr b="0" lang="en-IN" sz="2000" spc="-1" strike="noStrike">
-              <a:solidFill>
-                <a:srgbClr val="000000"/>
-              </a:solidFill>
-              <a:uFill>
-                <a:solidFill>
-                  <a:srgbClr val="ffffff"/>
-                </a:solidFill>
-              </a:uFill>
-              <a:latin typeface="Arial"/>
-            </a:endParaRPr>
-          </a:p>
-        </p:txBody>
-      </p:sp>
-    </p:spTree>
-  </p:cSld>
-  <p:clrMap bg1="lt1" bg2="lt2" tx1="dk1" tx2="dk2" accent1="accent1" accent2="accent2" accent3="accent3" accent4="accent4" accent5="accent5" accent6="accent6" hlink="hlink" folHlink="folHlink"/>
-  <p:sldLayoutIdLst>
-    <p:sldLayoutId id="2147483714" r:id="rId2"/>
-    <p:sldLayoutId id="2147483715" r:id="rId3"/>
-    <p:sldLayoutId id="2147483716" r:id="rId4"/>
-    <p:sldLayoutId id="2147483717" r:id="rId5"/>
-    <p:sldLayoutId id="2147483718" r:id="rId6"/>
-    <p:sldLayoutId id="2147483719" r:id="rId7"/>
-    <p:sldLayoutId id="2147483720" r:id="rId8"/>
-    <p:sldLayoutId id="2147483721" r:id="rId9"/>
-    <p:sldLayoutId id="2147483722" r:id="rId10"/>
-    <p:sldLayoutId id="2147483723" r:id="rId11"/>
-    <p:sldLayoutId id="2147483724" r:id="rId12"/>
-    <p:sldLayoutId id="2147483725" r:id="rId13"/>
+    <p:sldLayoutId id="2147483714" r:id="rId5"/>
+    <p:sldLayoutId id="2147483715" r:id="rId6"/>
+    <p:sldLayoutId id="2147483716" r:id="rId7"/>
+    <p:sldLayoutId id="2147483717" r:id="rId8"/>
+    <p:sldLayoutId id="2147483718" r:id="rId9"/>
+    <p:sldLayoutId id="2147483719" r:id="rId10"/>
+    <p:sldLayoutId id="2147483720" r:id="rId11"/>
+    <p:sldLayoutId id="2147483721" r:id="rId12"/>
+    <p:sldLayoutId id="2147483722" r:id="rId13"/>
+    <p:sldLayoutId id="2147483723" r:id="rId14"/>
+    <p:sldLayoutId id="2147483724" r:id="rId15"/>
+    <p:sldLayoutId id="2147483725" r:id="rId16"/>
   </p:sldLayoutIdLst>
 </p:sldMaster>
 </file>
@@ -12000,7 +11902,7 @@
         <p:spPr>
           <a:xfrm>
             <a:off x="503640" y="1768680"/>
-            <a:ext cx="9069480" cy="4382280"/>
+            <a:ext cx="9068760" cy="4381560"/>
           </a:xfrm>
           <a:prstGeom prst="rect">
             <a:avLst/>
@@ -12162,7 +12064,7 @@
         <p:spPr>
           <a:xfrm>
             <a:off x="504000" y="147600"/>
-            <a:ext cx="9285480" cy="939600"/>
+            <a:ext cx="9284760" cy="938880"/>
           </a:xfrm>
           <a:prstGeom prst="rect">
             <a:avLst/>
@@ -12183,7 +12085,7 @@
           <a:p>
             <a:pPr>
               <a:lnSpc>
-                <a:spcPts val="1"/>
+                <a:spcPts val="0"/>
               </a:lnSpc>
             </a:pPr>
             <a:endParaRPr b="0" lang="en-IN" sz="1800" spc="-1" strike="noStrike">
@@ -12201,7 +12103,7 @@
           <a:p>
             <a:pPr>
               <a:lnSpc>
-                <a:spcPts val="1"/>
+                <a:spcPts val="0"/>
               </a:lnSpc>
             </a:pPr>
             <a:endParaRPr b="0" lang="en-IN" sz="1800" spc="-1" strike="noStrike">
@@ -12219,7 +12121,7 @@
           <a:p>
             <a:pPr>
               <a:lnSpc>
-                <a:spcPts val="1"/>
+                <a:spcPts val="0"/>
               </a:lnSpc>
             </a:pPr>
             <a:r>
@@ -12252,7 +12154,7 @@
           <a:p>
             <a:pPr>
               <a:lnSpc>
-                <a:spcPts val="1"/>
+                <a:spcPts val="0"/>
               </a:lnSpc>
             </a:pPr>
             <a:endParaRPr b="0" lang="en-IN" sz="1800" spc="-1" strike="noStrike">
@@ -12270,7 +12172,7 @@
           <a:p>
             <a:pPr>
               <a:lnSpc>
-                <a:spcPts val="1"/>
+                <a:spcPts val="0"/>
               </a:lnSpc>
             </a:pPr>
             <a:endParaRPr b="0" lang="en-IN" sz="1800" spc="-1" strike="noStrike">
@@ -12296,7 +12198,7 @@
         <p:spPr>
           <a:xfrm>
             <a:off x="477360" y="1037880"/>
-            <a:ext cx="9313920" cy="6233040"/>
+            <a:ext cx="9313200" cy="6232320"/>
           </a:xfrm>
           <a:prstGeom prst="rect">
             <a:avLst/>
@@ -12417,7 +12319,7 @@
             </a:endParaRPr>
           </a:p>
           <a:p>
-            <a:pPr marL="216000" indent="-214920">
+            <a:pPr marL="216000" indent="-214200">
               <a:lnSpc>
                 <a:spcPct val="100000"/>
               </a:lnSpc>
@@ -12528,7 +12430,7 @@
             </a:endParaRPr>
           </a:p>
           <a:p>
-            <a:pPr marL="216000" indent="-214920">
+            <a:pPr marL="216000" indent="-214200">
               <a:lnSpc>
                 <a:spcPct val="100000"/>
               </a:lnSpc>
@@ -12609,7 +12511,7 @@
             </a:endParaRPr>
           </a:p>
           <a:p>
-            <a:pPr marL="216000" indent="-214920">
+            <a:pPr marL="216000" indent="-214200">
               <a:lnSpc>
                 <a:spcPct val="100000"/>
               </a:lnSpc>
@@ -13850,7 +13752,7 @@
         <p:spPr>
           <a:xfrm>
             <a:off x="944640" y="6091560"/>
-            <a:ext cx="4310640" cy="747720"/>
+            <a:ext cx="4309920" cy="747000"/>
           </a:xfrm>
           <a:prstGeom prst="rect">
             <a:avLst/>
@@ -13917,7 +13819,7 @@
         <p:spPr>
           <a:xfrm>
             <a:off x="181440" y="792000"/>
-            <a:ext cx="5829840" cy="6261840"/>
+            <a:ext cx="5829120" cy="6261120"/>
           </a:xfrm>
           <a:prstGeom prst="rect">
             <a:avLst/>
@@ -13947,7 +13849,7 @@
         <p:spPr>
           <a:xfrm>
             <a:off x="0" y="0"/>
-            <a:ext cx="8133840" cy="557280"/>
+            <a:ext cx="8133120" cy="556560"/>
           </a:xfrm>
           <a:prstGeom prst="rect">
             <a:avLst/>
@@ -14009,7 +13911,7 @@
         <p:spPr>
           <a:xfrm>
             <a:off x="360000" y="1060560"/>
-            <a:ext cx="1092600" cy="2847960"/>
+            <a:ext cx="1091880" cy="2847240"/>
           </a:xfrm>
           <a:prstGeom prst="rect">
             <a:avLst/>
@@ -14040,7 +13942,7 @@
         <p:spPr>
           <a:xfrm>
             <a:off x="-5441760" y="2586600"/>
-            <a:ext cx="2867040" cy="3849840"/>
+            <a:ext cx="2866320" cy="3849120"/>
           </a:xfrm>
           <a:prstGeom prst="rect">
             <a:avLst/>
@@ -14071,7 +13973,7 @@
         <p:spPr>
           <a:xfrm>
             <a:off x="433080" y="2791080"/>
-            <a:ext cx="946800" cy="914400"/>
+            <a:ext cx="946080" cy="913680"/>
           </a:xfrm>
           <a:prstGeom prst="rect">
             <a:avLst/>
@@ -14138,7 +14040,7 @@
         <p:spPr>
           <a:xfrm>
             <a:off x="433080" y="1722240"/>
-            <a:ext cx="946800" cy="812160"/>
+            <a:ext cx="946080" cy="811440"/>
           </a:xfrm>
           <a:prstGeom prst="rect">
             <a:avLst/>
@@ -14205,7 +14107,7 @@
         <p:spPr>
           <a:xfrm>
             <a:off x="1539360" y="2027520"/>
-            <a:ext cx="2989800" cy="914400"/>
+            <a:ext cx="2989080" cy="913680"/>
           </a:xfrm>
           <a:prstGeom prst="rect">
             <a:avLst/>
@@ -14272,7 +14174,7 @@
         <p:spPr>
           <a:xfrm>
             <a:off x="1539360" y="1060560"/>
-            <a:ext cx="1483920" cy="812160"/>
+            <a:ext cx="1483200" cy="811440"/>
           </a:xfrm>
           <a:prstGeom prst="rect">
             <a:avLst/>
@@ -14339,7 +14241,7 @@
         <p:spPr>
           <a:xfrm>
             <a:off x="3144960" y="1060560"/>
-            <a:ext cx="1384560" cy="812160"/>
+            <a:ext cx="1383840" cy="811440"/>
           </a:xfrm>
           <a:prstGeom prst="rect">
             <a:avLst/>
@@ -14406,7 +14308,7 @@
         <p:spPr>
           <a:xfrm>
             <a:off x="1539360" y="3096360"/>
-            <a:ext cx="1457640" cy="812160"/>
+            <a:ext cx="1456920" cy="811440"/>
           </a:xfrm>
           <a:prstGeom prst="rect">
             <a:avLst/>
@@ -14473,7 +14375,7 @@
         <p:spPr>
           <a:xfrm>
             <a:off x="4604760" y="1060560"/>
-            <a:ext cx="1092600" cy="2847960"/>
+            <a:ext cx="1091880" cy="2847240"/>
           </a:xfrm>
           <a:prstGeom prst="rect">
             <a:avLst/>
@@ -14503,8 +14405,8 @@
         </p:nvSpPr>
         <p:spPr>
           <a:xfrm rot="1200">
-            <a:off x="4785120" y="1017000"/>
-            <a:ext cx="837360" cy="549000"/>
+            <a:off x="4784400" y="1017000"/>
+            <a:ext cx="836640" cy="548280"/>
           </a:xfrm>
           <a:prstGeom prst="rect">
             <a:avLst/>
@@ -14566,7 +14468,7 @@
         <p:spPr>
           <a:xfrm>
             <a:off x="4677840" y="2435040"/>
-            <a:ext cx="946800" cy="607680"/>
+            <a:ext cx="946080" cy="606960"/>
           </a:xfrm>
           <a:prstGeom prst="rect">
             <a:avLst/>
@@ -14633,7 +14535,7 @@
         <p:spPr>
           <a:xfrm>
             <a:off x="4677840" y="1722240"/>
-            <a:ext cx="946800" cy="556920"/>
+            <a:ext cx="946080" cy="556200"/>
           </a:xfrm>
           <a:prstGeom prst="rect">
             <a:avLst/>
@@ -14700,7 +14602,7 @@
         <p:spPr>
           <a:xfrm>
             <a:off x="3144960" y="3096360"/>
-            <a:ext cx="1384560" cy="812160"/>
+            <a:ext cx="1383840" cy="811440"/>
           </a:xfrm>
           <a:prstGeom prst="rect">
             <a:avLst/>
@@ -14767,7 +14669,7 @@
         <p:spPr>
           <a:xfrm>
             <a:off x="4677840" y="3198600"/>
-            <a:ext cx="946800" cy="607680"/>
+            <a:ext cx="946080" cy="606960"/>
           </a:xfrm>
           <a:prstGeom prst="rect">
             <a:avLst/>
@@ -14834,7 +14736,7 @@
         <p:spPr>
           <a:xfrm>
             <a:off x="2962440" y="6024240"/>
-            <a:ext cx="174240" cy="286200"/>
+            <a:ext cx="173520" cy="285480"/>
           </a:xfrm>
           <a:prstGeom prst="upDownArrow">
             <a:avLst>
@@ -14866,7 +14768,7 @@
         <p:spPr>
           <a:xfrm>
             <a:off x="2962440" y="3864600"/>
-            <a:ext cx="174240" cy="286200"/>
+            <a:ext cx="173520" cy="285480"/>
           </a:xfrm>
           <a:prstGeom prst="upDownArrow">
             <a:avLst>
@@ -14897,8 +14799,8 @@
         </p:nvSpPr>
         <p:spPr>
           <a:xfrm rot="1200">
-            <a:off x="394200" y="861840"/>
-            <a:ext cx="1099440" cy="549000"/>
+            <a:off x="393480" y="861120"/>
+            <a:ext cx="1098720" cy="548280"/>
           </a:xfrm>
           <a:prstGeom prst="rect">
             <a:avLst/>
@@ -14978,7 +14880,7 @@
         <p:spPr>
           <a:xfrm>
             <a:off x="1028520" y="4209120"/>
-            <a:ext cx="4310640" cy="1755720"/>
+            <a:ext cx="4309920" cy="1755000"/>
           </a:xfrm>
           <a:prstGeom prst="rect">
             <a:avLst/>
@@ -15045,7 +14947,7 @@
         <p:spPr>
           <a:xfrm>
             <a:off x="2561400" y="4154040"/>
-            <a:ext cx="1092240" cy="404280"/>
+            <a:ext cx="1091520" cy="403560"/>
           </a:xfrm>
           <a:prstGeom prst="rect">
             <a:avLst/>
@@ -15107,7 +15009,7 @@
         <p:spPr>
           <a:xfrm>
             <a:off x="4035600" y="4491720"/>
-            <a:ext cx="1239120" cy="1472400"/>
+            <a:ext cx="1238400" cy="1471680"/>
           </a:xfrm>
           <a:prstGeom prst="rect">
             <a:avLst/>
@@ -15174,7 +15076,7 @@
         <p:spPr>
           <a:xfrm>
             <a:off x="1163160" y="5328720"/>
-            <a:ext cx="702720" cy="563040"/>
+            <a:ext cx="702000" cy="562320"/>
           </a:xfrm>
           <a:prstGeom prst="rect">
             <a:avLst/>
@@ -15241,7 +15143,7 @@
         <p:spPr>
           <a:xfrm>
             <a:off x="1164240" y="4882680"/>
-            <a:ext cx="1457640" cy="404280"/>
+            <a:ext cx="1456920" cy="403560"/>
           </a:xfrm>
           <a:prstGeom prst="rect">
             <a:avLst/>
@@ -15308,7 +15210,7 @@
         <p:spPr>
           <a:xfrm>
             <a:off x="1919160" y="5328720"/>
-            <a:ext cx="702720" cy="563040"/>
+            <a:ext cx="702000" cy="562320"/>
           </a:xfrm>
           <a:prstGeom prst="rect">
             <a:avLst/>
@@ -15375,7 +15277,7 @@
         <p:spPr>
           <a:xfrm>
             <a:off x="360000" y="1060560"/>
-            <a:ext cx="1092600" cy="2847960"/>
+            <a:ext cx="1091880" cy="2847240"/>
           </a:xfrm>
           <a:prstGeom prst="rect">
             <a:avLst/>
@@ -15406,7 +15308,7 @@
         <p:spPr>
           <a:xfrm>
             <a:off x="433080" y="2791080"/>
-            <a:ext cx="946800" cy="914400"/>
+            <a:ext cx="946080" cy="913680"/>
           </a:xfrm>
           <a:prstGeom prst="rect">
             <a:avLst/>
@@ -15473,7 +15375,7 @@
         <p:spPr>
           <a:xfrm>
             <a:off x="433080" y="1722240"/>
-            <a:ext cx="946800" cy="812160"/>
+            <a:ext cx="946080" cy="811440"/>
           </a:xfrm>
           <a:prstGeom prst="rect">
             <a:avLst/>
@@ -15540,7 +15442,7 @@
         <p:spPr>
           <a:xfrm>
             <a:off x="1539360" y="1060560"/>
-            <a:ext cx="1483920" cy="812160"/>
+            <a:ext cx="1483200" cy="811440"/>
           </a:xfrm>
           <a:prstGeom prst="rect">
             <a:avLst/>
@@ -15607,7 +15509,7 @@
         <p:spPr>
           <a:xfrm>
             <a:off x="3144960" y="1060560"/>
-            <a:ext cx="1384560" cy="812160"/>
+            <a:ext cx="1383840" cy="811440"/>
           </a:xfrm>
           <a:prstGeom prst="rect">
             <a:avLst/>
@@ -15674,7 +15576,7 @@
         <p:spPr>
           <a:xfrm>
             <a:off x="1539360" y="3096360"/>
-            <a:ext cx="1457640" cy="812160"/>
+            <a:ext cx="1456920" cy="811440"/>
           </a:xfrm>
           <a:prstGeom prst="rect">
             <a:avLst/>
@@ -15741,7 +15643,7 @@
         <p:spPr>
           <a:xfrm>
             <a:off x="4604760" y="1060560"/>
-            <a:ext cx="1092600" cy="2847960"/>
+            <a:ext cx="1091880" cy="2847240"/>
           </a:xfrm>
           <a:prstGeom prst="rect">
             <a:avLst/>
@@ -15771,8 +15673,8 @@
         </p:nvSpPr>
         <p:spPr>
           <a:xfrm rot="1200">
-            <a:off x="4785120" y="1017000"/>
-            <a:ext cx="837360" cy="549000"/>
+            <a:off x="4784400" y="1017000"/>
+            <a:ext cx="836640" cy="548280"/>
           </a:xfrm>
           <a:prstGeom prst="rect">
             <a:avLst/>
@@ -15834,7 +15736,7 @@
         <p:spPr>
           <a:xfrm>
             <a:off x="4677840" y="2435040"/>
-            <a:ext cx="946800" cy="607680"/>
+            <a:ext cx="946080" cy="606960"/>
           </a:xfrm>
           <a:prstGeom prst="rect">
             <a:avLst/>
@@ -15901,7 +15803,7 @@
         <p:spPr>
           <a:xfrm>
             <a:off x="4677840" y="1722240"/>
-            <a:ext cx="946800" cy="556920"/>
+            <a:ext cx="946080" cy="556200"/>
           </a:xfrm>
           <a:prstGeom prst="rect">
             <a:avLst/>
@@ -15968,7 +15870,7 @@
         <p:spPr>
           <a:xfrm>
             <a:off x="4677840" y="3198600"/>
-            <a:ext cx="946800" cy="607680"/>
+            <a:ext cx="946080" cy="606960"/>
           </a:xfrm>
           <a:prstGeom prst="rect">
             <a:avLst/>
@@ -16035,7 +15937,7 @@
         <p:spPr>
           <a:xfrm>
             <a:off x="1171800" y="6348600"/>
-            <a:ext cx="1779480" cy="490680"/>
+            <a:ext cx="1778760" cy="489960"/>
           </a:xfrm>
           <a:prstGeom prst="rect">
             <a:avLst/>
@@ -16100,7 +16002,7 @@
         <p:spPr>
           <a:xfrm>
             <a:off x="2962440" y="6024240"/>
-            <a:ext cx="174240" cy="286200"/>
+            <a:ext cx="173520" cy="285480"/>
           </a:xfrm>
           <a:prstGeom prst="upDownArrow">
             <a:avLst>
@@ -16132,7 +16034,7 @@
         <p:spPr>
           <a:xfrm>
             <a:off x="2962440" y="3864600"/>
-            <a:ext cx="174240" cy="286200"/>
+            <a:ext cx="173520" cy="285480"/>
           </a:xfrm>
           <a:prstGeom prst="upDownArrow">
             <a:avLst>
@@ -16163,8 +16065,8 @@
         </p:nvSpPr>
         <p:spPr>
           <a:xfrm rot="1200">
-            <a:off x="394200" y="861840"/>
-            <a:ext cx="1099440" cy="549000"/>
+            <a:off x="393480" y="861120"/>
+            <a:ext cx="1098720" cy="548280"/>
           </a:xfrm>
           <a:prstGeom prst="rect">
             <a:avLst/>
@@ -16244,7 +16146,7 @@
         <p:spPr>
           <a:xfrm>
             <a:off x="2561400" y="4154040"/>
-            <a:ext cx="1092240" cy="404280"/>
+            <a:ext cx="1091520" cy="403560"/>
           </a:xfrm>
           <a:prstGeom prst="rect">
             <a:avLst/>
@@ -16306,7 +16208,7 @@
         <p:spPr>
           <a:xfrm>
             <a:off x="2735640" y="4752000"/>
-            <a:ext cx="1239120" cy="1212120"/>
+            <a:ext cx="1238400" cy="1211400"/>
           </a:xfrm>
           <a:prstGeom prst="rect">
             <a:avLst/>
@@ -16373,7 +16275,7 @@
         <p:spPr>
           <a:xfrm>
             <a:off x="1079280" y="4752000"/>
-            <a:ext cx="1596960" cy="1212120"/>
+            <a:ext cx="1596240" cy="1211400"/>
           </a:xfrm>
           <a:prstGeom prst="rect">
             <a:avLst/>
@@ -16440,7 +16342,7 @@
         <p:spPr>
           <a:xfrm>
             <a:off x="4035600" y="4752000"/>
-            <a:ext cx="1239120" cy="1212120"/>
+            <a:ext cx="1238400" cy="1211400"/>
           </a:xfrm>
           <a:prstGeom prst="rect">
             <a:avLst/>
@@ -16507,7 +16409,7 @@
         <p:spPr>
           <a:xfrm>
             <a:off x="1163160" y="5328720"/>
-            <a:ext cx="702720" cy="563040"/>
+            <a:ext cx="702000" cy="562320"/>
           </a:xfrm>
           <a:prstGeom prst="rect">
             <a:avLst/>
@@ -16574,7 +16476,7 @@
         <p:spPr>
           <a:xfrm>
             <a:off x="1164240" y="5040000"/>
-            <a:ext cx="1457640" cy="246960"/>
+            <a:ext cx="1456920" cy="246240"/>
           </a:xfrm>
           <a:prstGeom prst="rect">
             <a:avLst/>
@@ -16641,7 +16543,7 @@
         <p:spPr>
           <a:xfrm>
             <a:off x="1919160" y="5328720"/>
-            <a:ext cx="702720" cy="563040"/>
+            <a:ext cx="702000" cy="562320"/>
           </a:xfrm>
           <a:prstGeom prst="rect">
             <a:avLst/>
@@ -16708,7 +16610,7 @@
         <p:spPr>
           <a:xfrm>
             <a:off x="432000" y="7200000"/>
-            <a:ext cx="213840" cy="213840"/>
+            <a:ext cx="213120" cy="213120"/>
           </a:xfrm>
           <a:prstGeom prst="rect">
             <a:avLst/>
@@ -16738,7 +16640,7 @@
         <p:spPr>
           <a:xfrm>
             <a:off x="792000" y="7128000"/>
-            <a:ext cx="1581840" cy="344160"/>
+            <a:ext cx="1581120" cy="343440"/>
           </a:xfrm>
           <a:prstGeom prst="rect">
             <a:avLst/>
@@ -16795,7 +16697,7 @@
         <p:spPr>
           <a:xfrm>
             <a:off x="432000" y="7200000"/>
-            <a:ext cx="213840" cy="213840"/>
+            <a:ext cx="213120" cy="213120"/>
           </a:xfrm>
           <a:prstGeom prst="rect">
             <a:avLst/>
@@ -16825,7 +16727,7 @@
         <p:spPr>
           <a:xfrm>
             <a:off x="432000" y="7200000"/>
-            <a:ext cx="213840" cy="213840"/>
+            <a:ext cx="213120" cy="213120"/>
           </a:xfrm>
           <a:prstGeom prst="rect">
             <a:avLst/>
@@ -16855,7 +16757,7 @@
         <p:spPr>
           <a:xfrm>
             <a:off x="432000" y="7200000"/>
-            <a:ext cx="213840" cy="213840"/>
+            <a:ext cx="213120" cy="213120"/>
           </a:xfrm>
           <a:prstGeom prst="rect">
             <a:avLst/>
@@ -16885,7 +16787,7 @@
         <p:spPr>
           <a:xfrm>
             <a:off x="2664000" y="7200000"/>
-            <a:ext cx="213840" cy="213840"/>
+            <a:ext cx="213120" cy="213120"/>
           </a:xfrm>
           <a:prstGeom prst="rect">
             <a:avLst/>
@@ -16915,7 +16817,7 @@
         <p:spPr>
           <a:xfrm>
             <a:off x="2897640" y="7164000"/>
-            <a:ext cx="2013840" cy="501840"/>
+            <a:ext cx="2013120" cy="501120"/>
           </a:xfrm>
           <a:prstGeom prst="rect">
             <a:avLst/>
@@ -16972,7 +16874,7 @@
         <p:spPr>
           <a:xfrm>
             <a:off x="6408000" y="1080000"/>
-            <a:ext cx="3309840" cy="4439520"/>
+            <a:ext cx="3309120" cy="4438800"/>
           </a:xfrm>
           <a:prstGeom prst="rect">
             <a:avLst/>
@@ -17165,7 +17067,7 @@
         <p:spPr>
           <a:xfrm>
             <a:off x="1164240" y="5040000"/>
-            <a:ext cx="1457640" cy="246960"/>
+            <a:ext cx="1456920" cy="246240"/>
           </a:xfrm>
           <a:prstGeom prst="rect">
             <a:avLst/>
@@ -17232,7 +17134,7 @@
         <p:spPr>
           <a:xfrm>
             <a:off x="1164240" y="5040000"/>
-            <a:ext cx="1457640" cy="246960"/>
+            <a:ext cx="1456920" cy="246240"/>
           </a:xfrm>
           <a:prstGeom prst="rect">
             <a:avLst/>
@@ -17299,7 +17201,7 @@
         <p:spPr>
           <a:xfrm>
             <a:off x="1079280" y="4392000"/>
-            <a:ext cx="4195440" cy="246960"/>
+            <a:ext cx="4194720" cy="246240"/>
           </a:xfrm>
           <a:prstGeom prst="rect">
             <a:avLst/>
@@ -17366,7 +17268,7 @@
         <p:spPr>
           <a:xfrm>
             <a:off x="3259800" y="6333120"/>
-            <a:ext cx="1779480" cy="506160"/>
+            <a:ext cx="1778760" cy="505440"/>
           </a:xfrm>
           <a:prstGeom prst="rect">
             <a:avLst/>
@@ -17480,7 +17382,7 @@
         <p:spPr>
           <a:xfrm>
             <a:off x="504000" y="147600"/>
-            <a:ext cx="9285840" cy="939960"/>
+            <a:ext cx="9285120" cy="939240"/>
           </a:xfrm>
           <a:prstGeom prst="rect">
             <a:avLst/>
@@ -17501,7 +17403,7 @@
           <a:p>
             <a:pPr>
               <a:lnSpc>
-                <a:spcPts val="2"/>
+                <a:spcPts val="0"/>
               </a:lnSpc>
             </a:pPr>
             <a:r>
@@ -17546,7 +17448,7 @@
         <p:spPr>
           <a:xfrm>
             <a:off x="363600" y="1227240"/>
-            <a:ext cx="9355680" cy="4895280"/>
+            <a:ext cx="9354960" cy="4894560"/>
           </a:xfrm>
           <a:prstGeom prst="rect">
             <a:avLst/>
@@ -17565,7 +17467,7 @@
         <p:spPr>
           <a:xfrm>
             <a:off x="432000" y="6408000"/>
-            <a:ext cx="8999280" cy="345600"/>
+            <a:ext cx="8998560" cy="344880"/>
           </a:xfrm>
           <a:prstGeom prst="rect">
             <a:avLst/>
@@ -17671,7 +17573,7 @@
         <p:spPr>
           <a:xfrm>
             <a:off x="504000" y="-68400"/>
-            <a:ext cx="9285480" cy="939600"/>
+            <a:ext cx="9284760" cy="938880"/>
           </a:xfrm>
           <a:prstGeom prst="rect">
             <a:avLst/>
@@ -17692,7 +17594,7 @@
           <a:p>
             <a:pPr>
               <a:lnSpc>
-                <a:spcPts val="1"/>
+                <a:spcPts val="0"/>
               </a:lnSpc>
             </a:pPr>
             <a:r>
@@ -17733,7 +17635,7 @@
         <p:spPr>
           <a:xfrm>
             <a:off x="504000" y="720000"/>
-            <a:ext cx="8998560" cy="6965280"/>
+            <a:ext cx="8997840" cy="6964560"/>
           </a:xfrm>
           <a:prstGeom prst="rect">
             <a:avLst/>
@@ -17752,7 +17654,7 @@
         <p:txBody>
           <a:bodyPr lIns="90000" rIns="90000" tIns="45000" bIns="45000"/>
           <a:p>
-            <a:pPr marL="216000" indent="-214920">
+            <a:pPr marL="216000" indent="-214200">
               <a:lnSpc>
                 <a:spcPct val="100000"/>
               </a:lnSpc>
@@ -17761,7 +17663,7 @@
               </a:buBlip>
             </a:pPr>
             <a:r>
-              <a:rPr b="0" lang="en-IN" sz="2000" spc="-1" strike="noStrike">
+              <a:rPr b="0" lang="en-IN" sz="2200" spc="-1" strike="noStrike">
                 <a:solidFill>
                   <a:srgbClr val="000000"/>
                 </a:solidFill>
@@ -17788,7 +17690,7 @@
             </a:endParaRPr>
           </a:p>
           <a:p>
-            <a:pPr lvl="1" marL="432000" indent="-214920">
+            <a:pPr lvl="1" marL="432000" indent="-214200">
               <a:lnSpc>
                 <a:spcPct val="100000"/>
               </a:lnSpc>
@@ -17797,7 +17699,7 @@
               </a:buBlip>
             </a:pPr>
             <a:r>
-              <a:rPr b="0" lang="en-IN" sz="1600" spc="-1" strike="noStrike">
+              <a:rPr b="0" lang="en-IN" sz="1800" spc="-1" strike="noStrike">
                 <a:solidFill>
                   <a:srgbClr val="000000"/>
                 </a:solidFill>
@@ -17824,7 +17726,7 @@
             </a:endParaRPr>
           </a:p>
           <a:p>
-            <a:pPr marL="216000" indent="-214920">
+            <a:pPr marL="216000" indent="-214200">
               <a:lnSpc>
                 <a:spcPct val="100000"/>
               </a:lnSpc>
@@ -17833,43 +17735,7 @@
               </a:buBlip>
             </a:pPr>
             <a:r>
-              <a:rPr b="0" lang="en-IN" sz="1800" spc="-1" strike="noStrike">
-                <a:solidFill>
-                  <a:srgbClr val="000000"/>
-                </a:solidFill>
-                <a:uFill>
-                  <a:solidFill>
-                    <a:srgbClr val="ffffff"/>
-                  </a:solidFill>
-                </a:uFill>
-                <a:latin typeface="Arial"/>
-                <a:ea typeface="Noto Sans CJK SC Regular"/>
-              </a:rPr>
-              <a:t> </a:t>
-            </a:r>
-            <a:endParaRPr b="0" lang="en-IN" sz="1800" spc="-1" strike="noStrike">
-              <a:solidFill>
-                <a:srgbClr val="000000"/>
-              </a:solidFill>
-              <a:uFill>
-                <a:solidFill>
-                  <a:srgbClr val="ffffff"/>
-                </a:solidFill>
-              </a:uFill>
-              <a:latin typeface="Arial"/>
-            </a:endParaRPr>
-          </a:p>
-          <a:p>
-            <a:pPr marL="216000" indent="-214920">
-              <a:lnSpc>
-                <a:spcPct val="100000"/>
-              </a:lnSpc>
-              <a:buBlip>
-                <a:blip r:embed="rId4"/>
-              </a:buBlip>
-            </a:pPr>
-            <a:r>
-              <a:rPr b="0" lang="en-IN" sz="2000" spc="-1" strike="noStrike">
+              <a:rPr b="0" lang="en-IN" sz="2200" spc="-1" strike="noStrike">
                 <a:solidFill>
                   <a:srgbClr val="000000"/>
                 </a:solidFill>
@@ -17896,16 +17762,16 @@
             </a:endParaRPr>
           </a:p>
           <a:p>
-            <a:pPr lvl="1" marL="432000" indent="-214920">
+            <a:pPr lvl="1" marL="432000" indent="-214200">
               <a:lnSpc>
                 <a:spcPct val="100000"/>
               </a:lnSpc>
               <a:buBlip>
-                <a:blip r:embed="rId5"/>
+                <a:blip r:embed="rId4"/>
               </a:buBlip>
             </a:pPr>
             <a:r>
-              <a:rPr b="0" lang="en-IN" sz="1600" spc="-1" strike="noStrike">
+              <a:rPr b="0" lang="en-IN" sz="1800" spc="-1" strike="noStrike">
                 <a:solidFill>
                   <a:srgbClr val="000000"/>
                 </a:solidFill>
@@ -17932,16 +17798,16 @@
             </a:endParaRPr>
           </a:p>
           <a:p>
-            <a:pPr lvl="1" marL="432000" indent="-214920">
+            <a:pPr lvl="1" marL="432000" indent="-214200">
               <a:lnSpc>
                 <a:spcPct val="100000"/>
               </a:lnSpc>
               <a:buBlip>
-                <a:blip r:embed="rId6"/>
+                <a:blip r:embed="rId5"/>
               </a:buBlip>
             </a:pPr>
             <a:r>
-              <a:rPr b="0" lang="en-IN" sz="1600" spc="-1" strike="noStrike">
+              <a:rPr b="0" lang="en-IN" sz="1800" spc="-1" strike="noStrike">
                 <a:solidFill>
                   <a:srgbClr val="000000"/>
                 </a:solidFill>
@@ -17968,16 +17834,16 @@
             </a:endParaRPr>
           </a:p>
           <a:p>
-            <a:pPr lvl="1" marL="432000" indent="-214920">
+            <a:pPr lvl="1" marL="432000" indent="-214200">
               <a:lnSpc>
                 <a:spcPct val="100000"/>
               </a:lnSpc>
               <a:buBlip>
-                <a:blip r:embed="rId7"/>
+                <a:blip r:embed="rId6"/>
               </a:buBlip>
             </a:pPr>
             <a:r>
-              <a:rPr b="0" lang="en-IN" sz="1600" spc="-1" strike="noStrike">
+              <a:rPr b="0" lang="en-IN" sz="1800" spc="-1" strike="noStrike">
                 <a:solidFill>
                   <a:srgbClr val="000000"/>
                 </a:solidFill>
@@ -18004,16 +17870,16 @@
             </a:endParaRPr>
           </a:p>
           <a:p>
-            <a:pPr lvl="1" marL="432000" indent="-214920">
+            <a:pPr lvl="1" marL="432000" indent="-214200">
               <a:lnSpc>
                 <a:spcPct val="100000"/>
               </a:lnSpc>
               <a:buBlip>
-                <a:blip r:embed="rId8"/>
+                <a:blip r:embed="rId7"/>
               </a:buBlip>
             </a:pPr>
             <a:r>
-              <a:rPr b="0" lang="en-IN" sz="1600" spc="-1" strike="noStrike">
+              <a:rPr b="0" lang="en-IN" sz="1800" spc="-1" strike="noStrike">
                 <a:solidFill>
                   <a:srgbClr val="000000"/>
                 </a:solidFill>
@@ -18040,16 +17906,16 @@
             </a:endParaRPr>
           </a:p>
           <a:p>
-            <a:pPr lvl="1" marL="432000" indent="-214920">
+            <a:pPr lvl="1" marL="432000" indent="-214200">
               <a:lnSpc>
                 <a:spcPct val="100000"/>
               </a:lnSpc>
               <a:buBlip>
-                <a:blip r:embed="rId9"/>
+                <a:blip r:embed="rId8"/>
               </a:buBlip>
             </a:pPr>
             <a:r>
-              <a:rPr b="0" lang="en-IN" sz="1600" spc="-1" strike="noStrike">
+              <a:rPr b="0" lang="en-IN" sz="1800" spc="-1" strike="noStrike">
                 <a:solidFill>
                   <a:srgbClr val="000000"/>
                 </a:solidFill>
@@ -18076,16 +17942,16 @@
             </a:endParaRPr>
           </a:p>
           <a:p>
-            <a:pPr lvl="1" marL="432000" indent="-214920">
+            <a:pPr lvl="1" marL="432000" indent="-214200">
               <a:lnSpc>
                 <a:spcPct val="100000"/>
               </a:lnSpc>
               <a:buBlip>
-                <a:blip r:embed="rId10"/>
+                <a:blip r:embed="rId9"/>
               </a:buBlip>
             </a:pPr>
             <a:r>
-              <a:rPr b="0" lang="en-IN" sz="1600" spc="-1" strike="noStrike">
+              <a:rPr b="0" lang="en-IN" sz="1800" spc="-1" strike="noStrike">
                 <a:solidFill>
                   <a:srgbClr val="000000"/>
                 </a:solidFill>
@@ -18112,52 +17978,16 @@
             </a:endParaRPr>
           </a:p>
           <a:p>
-            <a:pPr marL="216000" indent="-214920">
+            <a:pPr marL="216000" indent="-214200">
               <a:lnSpc>
                 <a:spcPct val="100000"/>
               </a:lnSpc>
               <a:buBlip>
-                <a:blip r:embed="rId11"/>
+                <a:blip r:embed="rId10"/>
               </a:buBlip>
             </a:pPr>
             <a:r>
-              <a:rPr b="0" lang="en-IN" sz="1800" spc="-1" strike="noStrike">
-                <a:solidFill>
-                  <a:srgbClr val="000000"/>
-                </a:solidFill>
-                <a:uFill>
-                  <a:solidFill>
-                    <a:srgbClr val="ffffff"/>
-                  </a:solidFill>
-                </a:uFill>
-                <a:latin typeface="Arial"/>
-                <a:ea typeface="Noto Sans CJK SC Regular"/>
-              </a:rPr>
-              <a:t> </a:t>
-            </a:r>
-            <a:endParaRPr b="0" lang="en-IN" sz="1800" spc="-1" strike="noStrike">
-              <a:solidFill>
-                <a:srgbClr val="000000"/>
-              </a:solidFill>
-              <a:uFill>
-                <a:solidFill>
-                  <a:srgbClr val="ffffff"/>
-                </a:solidFill>
-              </a:uFill>
-              <a:latin typeface="Arial"/>
-            </a:endParaRPr>
-          </a:p>
-          <a:p>
-            <a:pPr marL="216000" indent="-214920">
-              <a:lnSpc>
-                <a:spcPct val="100000"/>
-              </a:lnSpc>
-              <a:buBlip>
-                <a:blip r:embed="rId12"/>
-              </a:buBlip>
-            </a:pPr>
-            <a:r>
-              <a:rPr b="0" lang="en-IN" sz="2000" spc="-1" strike="noStrike">
+              <a:rPr b="0" lang="en-IN" sz="2200" spc="-1" strike="noStrike">
                 <a:solidFill>
                   <a:srgbClr val="000000"/>
                 </a:solidFill>
@@ -18184,16 +18014,16 @@
             </a:endParaRPr>
           </a:p>
           <a:p>
-            <a:pPr lvl="1" marL="432000" indent="-214920">
+            <a:pPr lvl="1" marL="432000" indent="-214200">
               <a:lnSpc>
                 <a:spcPct val="100000"/>
               </a:lnSpc>
               <a:buBlip>
-                <a:blip r:embed="rId13"/>
+                <a:blip r:embed="rId11"/>
               </a:buBlip>
             </a:pPr>
             <a:r>
-              <a:rPr b="0" lang="en-IN" sz="1600" spc="-1" strike="noStrike">
+              <a:rPr b="0" lang="en-IN" sz="1800" spc="-1" strike="noStrike">
                 <a:solidFill>
                   <a:srgbClr val="000000"/>
                 </a:solidFill>
@@ -18220,16 +18050,16 @@
             </a:endParaRPr>
           </a:p>
           <a:p>
-            <a:pPr lvl="1" marL="432000" indent="-214920">
+            <a:pPr lvl="1" marL="432000" indent="-214200">
               <a:lnSpc>
                 <a:spcPct val="100000"/>
               </a:lnSpc>
               <a:buBlip>
-                <a:blip r:embed="rId14"/>
+                <a:blip r:embed="rId12"/>
               </a:buBlip>
             </a:pPr>
             <a:r>
-              <a:rPr b="0" lang="en-IN" sz="1600" spc="-1" strike="noStrike">
+              <a:rPr b="0" lang="en-IN" sz="1800" spc="-1" strike="noStrike">
                 <a:solidFill>
                   <a:srgbClr val="000000"/>
                 </a:solidFill>
@@ -18256,16 +18086,16 @@
             </a:endParaRPr>
           </a:p>
           <a:p>
-            <a:pPr lvl="1" marL="432000" indent="-214920">
+            <a:pPr lvl="1" marL="432000" indent="-214200">
               <a:lnSpc>
                 <a:spcPct val="100000"/>
               </a:lnSpc>
               <a:buBlip>
-                <a:blip r:embed="rId15"/>
+                <a:blip r:embed="rId13"/>
               </a:buBlip>
             </a:pPr>
             <a:r>
-              <a:rPr b="0" lang="en-IN" sz="1600" spc="-1" strike="noStrike">
+              <a:rPr b="0" lang="en-IN" sz="1800" spc="-1" strike="noStrike">
                 <a:solidFill>
                   <a:srgbClr val="000000"/>
                 </a:solidFill>
@@ -18292,16 +18122,16 @@
             </a:endParaRPr>
           </a:p>
           <a:p>
-            <a:pPr lvl="1" marL="432000" indent="-214920">
+            <a:pPr lvl="1" marL="432000" indent="-214200">
               <a:lnSpc>
                 <a:spcPct val="100000"/>
               </a:lnSpc>
               <a:buBlip>
-                <a:blip r:embed="rId16"/>
+                <a:blip r:embed="rId14"/>
               </a:buBlip>
             </a:pPr>
             <a:r>
-              <a:rPr b="0" lang="en-IN" sz="1600" spc="-1" strike="noStrike">
+              <a:rPr b="0" lang="en-IN" sz="1800" spc="-1" strike="noStrike">
                 <a:solidFill>
                   <a:srgbClr val="000000"/>
                 </a:solidFill>
@@ -18328,16 +18158,16 @@
             </a:endParaRPr>
           </a:p>
           <a:p>
-            <a:pPr lvl="1" marL="432000" indent="-214920">
+            <a:pPr lvl="1" marL="432000" indent="-214200">
               <a:lnSpc>
                 <a:spcPct val="100000"/>
               </a:lnSpc>
               <a:buBlip>
-                <a:blip r:embed="rId17"/>
+                <a:blip r:embed="rId15"/>
               </a:buBlip>
             </a:pPr>
             <a:r>
-              <a:rPr b="0" lang="en-IN" sz="1600" spc="-1" strike="noStrike">
+              <a:rPr b="0" lang="en-IN" sz="1800" spc="-1" strike="noStrike">
                 <a:solidFill>
                   <a:srgbClr val="000000"/>
                 </a:solidFill>
@@ -18364,52 +18194,16 @@
             </a:endParaRPr>
           </a:p>
           <a:p>
-            <a:pPr lvl="1" marL="432000" indent="-214920">
+            <a:pPr marL="216000" indent="-214200">
               <a:lnSpc>
                 <a:spcPct val="100000"/>
               </a:lnSpc>
               <a:buBlip>
-                <a:blip r:embed="rId18"/>
+                <a:blip r:embed="rId16"/>
               </a:buBlip>
             </a:pPr>
             <a:r>
-              <a:rPr b="0" lang="en-IN" sz="1400" spc="-1" strike="noStrike">
-                <a:solidFill>
-                  <a:srgbClr val="000000"/>
-                </a:solidFill>
-                <a:uFill>
-                  <a:solidFill>
-                    <a:srgbClr val="ffffff"/>
-                  </a:solidFill>
-                </a:uFill>
-                <a:latin typeface="Arial"/>
-                <a:ea typeface="Noto Sans CJK SC Regular"/>
-              </a:rPr>
-              <a:t> </a:t>
-            </a:r>
-            <a:endParaRPr b="0" lang="en-IN" sz="1800" spc="-1" strike="noStrike">
-              <a:solidFill>
-                <a:srgbClr val="000000"/>
-              </a:solidFill>
-              <a:uFill>
-                <a:solidFill>
-                  <a:srgbClr val="ffffff"/>
-                </a:solidFill>
-              </a:uFill>
-              <a:latin typeface="Arial"/>
-            </a:endParaRPr>
-          </a:p>
-          <a:p>
-            <a:pPr marL="216000" indent="-214920">
-              <a:lnSpc>
-                <a:spcPct val="100000"/>
-              </a:lnSpc>
-              <a:buBlip>
-                <a:blip r:embed="rId19"/>
-              </a:buBlip>
-            </a:pPr>
-            <a:r>
-              <a:rPr b="0" lang="en-IN" sz="2000" spc="-1" strike="noStrike">
+              <a:rPr b="0" lang="en-IN" sz="2200" spc="-1" strike="noStrike">
                 <a:solidFill>
                   <a:srgbClr val="000000"/>
                 </a:solidFill>
@@ -18436,16 +18230,16 @@
             </a:endParaRPr>
           </a:p>
           <a:p>
-            <a:pPr lvl="1" marL="432000" indent="-214920">
+            <a:pPr lvl="1" marL="432000" indent="-214200">
               <a:lnSpc>
                 <a:spcPct val="100000"/>
               </a:lnSpc>
               <a:buBlip>
-                <a:blip r:embed="rId20"/>
+                <a:blip r:embed="rId17"/>
               </a:buBlip>
             </a:pPr>
             <a:r>
-              <a:rPr b="0" lang="en-IN" sz="1600" spc="-1" strike="noStrike">
+              <a:rPr b="0" lang="en-IN" sz="1800" spc="-1" strike="noStrike">
                 <a:solidFill>
                   <a:srgbClr val="000000"/>
                 </a:solidFill>
@@ -18472,52 +18266,16 @@
             </a:endParaRPr>
           </a:p>
           <a:p>
-            <a:pPr lvl="1" marL="432000" indent="-214920">
+            <a:pPr marL="216000" indent="-214200">
               <a:lnSpc>
                 <a:spcPct val="100000"/>
               </a:lnSpc>
               <a:buBlip>
-                <a:blip r:embed="rId21"/>
+                <a:blip r:embed="rId18"/>
               </a:buBlip>
             </a:pPr>
             <a:r>
-              <a:rPr b="0" lang="en-IN" sz="1400" spc="-1" strike="noStrike">
-                <a:solidFill>
-                  <a:srgbClr val="000000"/>
-                </a:solidFill>
-                <a:uFill>
-                  <a:solidFill>
-                    <a:srgbClr val="ffffff"/>
-                  </a:solidFill>
-                </a:uFill>
-                <a:latin typeface="Arial"/>
-                <a:ea typeface="Noto Sans CJK SC Regular"/>
-              </a:rPr>
-              <a:t> </a:t>
-            </a:r>
-            <a:endParaRPr b="0" lang="en-IN" sz="1800" spc="-1" strike="noStrike">
-              <a:solidFill>
-                <a:srgbClr val="000000"/>
-              </a:solidFill>
-              <a:uFill>
-                <a:solidFill>
-                  <a:srgbClr val="ffffff"/>
-                </a:solidFill>
-              </a:uFill>
-              <a:latin typeface="Arial"/>
-            </a:endParaRPr>
-          </a:p>
-          <a:p>
-            <a:pPr marL="216000" indent="-214920">
-              <a:lnSpc>
-                <a:spcPct val="100000"/>
-              </a:lnSpc>
-              <a:buBlip>
-                <a:blip r:embed="rId22"/>
-              </a:buBlip>
-            </a:pPr>
-            <a:r>
-              <a:rPr b="0" lang="en-IN" sz="2000" spc="-1" strike="noStrike">
+              <a:rPr b="0" lang="en-IN" sz="2200" spc="-1" strike="noStrike">
                 <a:solidFill>
                   <a:srgbClr val="000000"/>
                 </a:solidFill>
@@ -18544,16 +18302,16 @@
             </a:endParaRPr>
           </a:p>
           <a:p>
-            <a:pPr lvl="1" marL="432000" indent="-214920">
+            <a:pPr lvl="1" marL="432000" indent="-214200">
               <a:lnSpc>
                 <a:spcPct val="100000"/>
               </a:lnSpc>
               <a:buBlip>
-                <a:blip r:embed="rId23"/>
+                <a:blip r:embed="rId19"/>
               </a:buBlip>
             </a:pPr>
             <a:r>
-              <a:rPr b="0" lang="en-IN" sz="1600" spc="-1" strike="noStrike">
+              <a:rPr b="0" lang="en-IN" sz="1800" spc="-1" strike="noStrike">
                 <a:solidFill>
                   <a:srgbClr val="000000"/>
                 </a:solidFill>
@@ -18566,42 +18324,6 @@
                 <a:ea typeface="Noto Sans CJK SC Regular"/>
               </a:rPr>
               <a:t>Provide a button in mecm portal to syncronize app instance info from edge to mecm-appo/inventory</a:t>
-            </a:r>
-            <a:endParaRPr b="0" lang="en-IN" sz="1800" spc="-1" strike="noStrike">
-              <a:solidFill>
-                <a:srgbClr val="000000"/>
-              </a:solidFill>
-              <a:uFill>
-                <a:solidFill>
-                  <a:srgbClr val="ffffff"/>
-                </a:solidFill>
-              </a:uFill>
-              <a:latin typeface="Arial"/>
-            </a:endParaRPr>
-          </a:p>
-          <a:p>
-            <a:pPr marL="216000" indent="-214920">
-              <a:lnSpc>
-                <a:spcPct val="100000"/>
-              </a:lnSpc>
-              <a:buBlip>
-                <a:blip r:embed="rId24"/>
-              </a:buBlip>
-            </a:pPr>
-            <a:r>
-              <a:rPr b="0" lang="en-IN" sz="2200" spc="-1" strike="noStrike">
-                <a:solidFill>
-                  <a:srgbClr val="000000"/>
-                </a:solidFill>
-                <a:uFill>
-                  <a:solidFill>
-                    <a:srgbClr val="ffffff"/>
-                  </a:solidFill>
-                </a:uFill>
-                <a:latin typeface="Arial"/>
-                <a:ea typeface="Noto Sans CJK SC Regular"/>
-              </a:rPr>
-              <a:t> </a:t>
             </a:r>
             <a:endParaRPr b="0" lang="en-IN" sz="1800" spc="-1" strike="noStrike">
               <a:solidFill>
@@ -18675,7 +18397,7 @@
         <p:spPr>
           <a:xfrm>
             <a:off x="288000" y="39600"/>
-            <a:ext cx="5686560" cy="940680"/>
+            <a:ext cx="5685840" cy="939960"/>
           </a:xfrm>
           <a:prstGeom prst="rect">
             <a:avLst/>
@@ -18696,7 +18418,7 @@
           <a:p>
             <a:pPr>
               <a:lnSpc>
-                <a:spcPts val="19"/>
+                <a:spcPts val="2"/>
               </a:lnSpc>
             </a:pPr>
             <a:r>
@@ -20880,7 +20602,7 @@
         <p:spPr>
           <a:xfrm>
             <a:off x="288000" y="39600"/>
-            <a:ext cx="5686560" cy="940680"/>
+            <a:ext cx="5685840" cy="939960"/>
           </a:xfrm>
           <a:prstGeom prst="rect">
             <a:avLst/>
@@ -20901,7 +20623,7 @@
           <a:p>
             <a:pPr>
               <a:lnSpc>
-                <a:spcPts val="19"/>
+                <a:spcPts val="2"/>
               </a:lnSpc>
             </a:pPr>
             <a:r>
@@ -22165,7 +21887,7 @@
         <p:spPr>
           <a:xfrm>
             <a:off x="226440" y="230400"/>
-            <a:ext cx="7188480" cy="560520"/>
+            <a:ext cx="7187760" cy="559800"/>
           </a:xfrm>
           <a:prstGeom prst="rect">
             <a:avLst/>
@@ -22186,7 +21908,7 @@
           <a:p>
             <a:pPr>
               <a:lnSpc>
-                <a:spcPts val="7"/>
+                <a:spcPts val="1"/>
               </a:lnSpc>
             </a:pPr>
             <a:r>
@@ -22227,7 +21949,7 @@
         <p:spPr>
           <a:xfrm>
             <a:off x="288000" y="1008000"/>
-            <a:ext cx="9575640" cy="5395680"/>
+            <a:ext cx="9574920" cy="5394960"/>
           </a:xfrm>
           <a:prstGeom prst="rect">
             <a:avLst/>
@@ -22350,24 +22072,6 @@
                 <a:spcPct val="100000"/>
               </a:lnSpc>
             </a:pPr>
-            <a:endParaRPr b="0" lang="en-IN" sz="1800" spc="-1" strike="noStrike">
-              <a:solidFill>
-                <a:srgbClr val="000000"/>
-              </a:solidFill>
-              <a:uFill>
-                <a:solidFill>
-                  <a:srgbClr val="ffffff"/>
-                </a:solidFill>
-              </a:uFill>
-              <a:latin typeface="Arial"/>
-            </a:endParaRPr>
-          </a:p>
-          <a:p>
-            <a:pPr>
-              <a:lnSpc>
-                <a:spcPct val="100000"/>
-              </a:lnSpc>
-            </a:pPr>
             <a:r>
               <a:rPr b="0" lang="en-IN" sz="1800" spc="-1" strike="noStrike">
                 <a:solidFill>
@@ -22467,24 +22171,6 @@
                 <a:spcPct val="100000"/>
               </a:lnSpc>
             </a:pPr>
-            <a:endParaRPr b="0" lang="en-IN" sz="1800" spc="-1" strike="noStrike">
-              <a:solidFill>
-                <a:srgbClr val="000000"/>
-              </a:solidFill>
-              <a:uFill>
-                <a:solidFill>
-                  <a:srgbClr val="ffffff"/>
-                </a:solidFill>
-              </a:uFill>
-              <a:latin typeface="Arial"/>
-            </a:endParaRPr>
-          </a:p>
-          <a:p>
-            <a:pPr>
-              <a:lnSpc>
-                <a:spcPct val="100000"/>
-              </a:lnSpc>
-            </a:pPr>
             <a:r>
               <a:rPr b="0" lang="en-IN" sz="1800" spc="-1" strike="noStrike">
                 <a:solidFill>
@@ -22536,26 +22222,8 @@
                 <a:spcPct val="100000"/>
               </a:lnSpc>
             </a:pPr>
-            <a:endParaRPr b="0" lang="en-IN" sz="1800" spc="-1" strike="noStrike">
-              <a:solidFill>
-                <a:srgbClr val="000000"/>
-              </a:solidFill>
-              <a:uFill>
-                <a:solidFill>
-                  <a:srgbClr val="ffffff"/>
-                </a:solidFill>
-              </a:uFill>
-              <a:latin typeface="Arial"/>
-            </a:endParaRPr>
-          </a:p>
-          <a:p>
-            <a:pPr>
-              <a:lnSpc>
-                <a:spcPct val="100000"/>
-              </a:lnSpc>
-            </a:pPr>
             <a:r>
-              <a:rPr b="0" lang="en-IN" sz="1800" spc="-1" strike="noStrike">
+              <a:rPr b="1" lang="en-IN" sz="1800" spc="-1" strike="noStrike">
                 <a:solidFill>
                   <a:srgbClr val="000000"/>
                 </a:solidFill>
@@ -22567,7 +22235,7 @@
                 <a:latin typeface="Calibri"/>
                 <a:ea typeface="DejaVu Sans"/>
               </a:rPr>
-              <a:t>* Syncronization from edge to cloud in IOT usecases is not required.</a:t>
+              <a:t>WorkFlow:</a:t>
             </a:r>
             <a:endParaRPr b="0" lang="en-IN" sz="1800" spc="-1" strike="noStrike">
               <a:solidFill>
@@ -22599,8 +22267,85 @@
               <a:latin typeface="Arial"/>
             </a:endParaRPr>
           </a:p>
-        </p:txBody>
-      </p:sp>
+          <a:p>
+            <a:pPr>
+              <a:lnSpc>
+                <a:spcPct val="100000"/>
+              </a:lnSpc>
+            </a:pPr>
+            <a:endParaRPr b="0" lang="en-IN" sz="1800" spc="-1" strike="noStrike">
+              <a:solidFill>
+                <a:srgbClr val="000000"/>
+              </a:solidFill>
+              <a:uFill>
+                <a:solidFill>
+                  <a:srgbClr val="ffffff"/>
+                </a:solidFill>
+              </a:uFill>
+              <a:latin typeface="Arial"/>
+            </a:endParaRPr>
+          </a:p>
+          <a:p>
+            <a:pPr>
+              <a:lnSpc>
+                <a:spcPct val="100000"/>
+              </a:lnSpc>
+            </a:pPr>
+            <a:endParaRPr b="0" lang="en-IN" sz="1800" spc="-1" strike="noStrike">
+              <a:solidFill>
+                <a:srgbClr val="000000"/>
+              </a:solidFill>
+              <a:uFill>
+                <a:solidFill>
+                  <a:srgbClr val="ffffff"/>
+                </a:solidFill>
+              </a:uFill>
+              <a:latin typeface="Arial"/>
+            </a:endParaRPr>
+          </a:p>
+          <a:p>
+            <a:pPr>
+              <a:lnSpc>
+                <a:spcPct val="100000"/>
+              </a:lnSpc>
+            </a:pPr>
+            <a:endParaRPr b="0" lang="en-IN" sz="1800" spc="-1" strike="noStrike">
+              <a:solidFill>
+                <a:srgbClr val="000000"/>
+              </a:solidFill>
+              <a:uFill>
+                <a:solidFill>
+                  <a:srgbClr val="ffffff"/>
+                </a:solidFill>
+              </a:uFill>
+              <a:latin typeface="Arial"/>
+            </a:endParaRPr>
+          </a:p>
+        </p:txBody>
+      </p:sp>
+      <p:pic>
+        <p:nvPicPr>
+          <p:cNvPr id="306" name="" descr=""/>
+          <p:cNvPicPr/>
+          <p:nvPr/>
+        </p:nvPicPr>
+        <p:blipFill>
+          <a:blip r:embed="rId1"/>
+          <a:stretch/>
+        </p:blipFill>
+        <p:spPr>
+          <a:xfrm>
+            <a:off x="504000" y="4335120"/>
+            <a:ext cx="4914360" cy="2504520"/>
+          </a:xfrm>
+          <a:prstGeom prst="rect">
+            <a:avLst/>
+          </a:prstGeom>
+          <a:ln>
+            <a:noFill/>
+          </a:ln>
+        </p:spPr>
+      </p:pic>
     </p:spTree>
   </p:cSld>
   <p:timing>

</xml_diff>